<commit_message>
Präsentation (p2 ist Final)
</commit_message>
<xml_diff>
--- a/p2.pptx
+++ b/p2.pptx
@@ -11,18 +11,18 @@
     <p:sldId id="256" r:id="rId2"/>
     <p:sldId id="258" r:id="rId3"/>
     <p:sldId id="264" r:id="rId4"/>
-    <p:sldId id="265" r:id="rId5"/>
-    <p:sldId id="280" r:id="rId6"/>
-    <p:sldId id="268" r:id="rId7"/>
-    <p:sldId id="269" r:id="rId8"/>
+    <p:sldId id="257" r:id="rId5"/>
+    <p:sldId id="265" r:id="rId6"/>
+    <p:sldId id="280" r:id="rId7"/>
+    <p:sldId id="268" r:id="rId8"/>
     <p:sldId id="259" r:id="rId9"/>
-    <p:sldId id="257" r:id="rId10"/>
-    <p:sldId id="260" r:id="rId11"/>
-    <p:sldId id="266" r:id="rId12"/>
-    <p:sldId id="261" r:id="rId13"/>
-    <p:sldId id="270" r:id="rId14"/>
-    <p:sldId id="275" r:id="rId15"/>
-    <p:sldId id="276" r:id="rId16"/>
+    <p:sldId id="260" r:id="rId10"/>
+    <p:sldId id="266" r:id="rId11"/>
+    <p:sldId id="261" r:id="rId12"/>
+    <p:sldId id="270" r:id="rId13"/>
+    <p:sldId id="275" r:id="rId14"/>
+    <p:sldId id="276" r:id="rId15"/>
+    <p:sldId id="269" r:id="rId16"/>
     <p:sldId id="273" r:id="rId17"/>
     <p:sldId id="289" r:id="rId18"/>
     <p:sldId id="290" r:id="rId19"/>
@@ -739,7 +739,7 @@
           <a:p>
             <a:fld id="{894D4214-1CB4-4B06-8ECB-CDCB06B574BD}" type="slidenum">
               <a:rPr lang="de-AT" smtClean="0"/>
-              <a:t>15</a:t>
+              <a:t>14</a:t>
             </a:fld>
             <a:endParaRPr lang="de-AT"/>
           </a:p>
@@ -916,7 +916,7 @@
     </p:spTree>
     <p:extLst>
       <p:ext uri="{BB962C8B-B14F-4D97-AF65-F5344CB8AC3E}">
-        <p14:creationId xmlns:p14="http://schemas.microsoft.com/office/powerpoint/2010/main" val="2108256809"/>
+        <p14:creationId xmlns:p14="http://schemas.microsoft.com/office/powerpoint/2010/main" val="2693117743"/>
       </p:ext>
     </p:extLst>
   </p:cSld>
@@ -1305,13 +1305,18 @@
         <p:spPr/>
         <p:txBody>
           <a:bodyPr/>
-          <a:lstStyle/>
-          <a:p>
-            <a:r>
+          <a:lstStyle>
+            <a:lvl1pPr>
+              <a:defRPr sz="1600"/>
+            </a:lvl1pPr>
+          </a:lstStyle>
+          <a:p>
+            <a:fld id="{06D42EB5-09BE-484E-A776-76EBF8E2BCAC}" type="datetime1">
               <a:rPr lang="de-DE" smtClean="0"/>
+              <a:pPr/>
               <a:t>20.03.2015</a:t>
-            </a:r>
-            <a:endParaRPr lang="de-AT"/>
+            </a:fld>
+            <a:endParaRPr lang="de-AT" dirty="0"/>
           </a:p>
         </p:txBody>
       </p:sp>
@@ -1328,13 +1333,17 @@
         <p:spPr/>
         <p:txBody>
           <a:bodyPr/>
-          <a:lstStyle/>
-          <a:p>
-            <a:r>
-              <a:rPr lang="de-AT" smtClean="0"/>
+          <a:lstStyle>
+            <a:lvl1pPr>
+              <a:defRPr sz="1600"/>
+            </a:lvl1pPr>
+          </a:lstStyle>
+          <a:p>
+            <a:r>
+              <a:rPr lang="de-AT" dirty="0" smtClean="0"/>
               <a:t>SOA, REST &amp; JSON</a:t>
             </a:r>
-            <a:endParaRPr lang="de-AT"/>
+            <a:endParaRPr lang="de-AT" dirty="0"/>
           </a:p>
         </p:txBody>
       </p:sp>
@@ -1351,13 +1360,18 @@
         <p:spPr/>
         <p:txBody>
           <a:bodyPr/>
-          <a:lstStyle/>
+          <a:lstStyle>
+            <a:lvl1pPr>
+              <a:defRPr sz="2000"/>
+            </a:lvl1pPr>
+          </a:lstStyle>
           <a:p>
             <a:fld id="{0582A2BA-FDDD-4C1C-9C58-E41C263E2DD2}" type="slidenum">
               <a:rPr lang="de-AT" smtClean="0"/>
+              <a:pPr/>
               <a:t>‹Nr.›</a:t>
             </a:fld>
-            <a:endParaRPr lang="de-AT"/>
+            <a:endParaRPr lang="de-AT" dirty="0"/>
           </a:p>
         </p:txBody>
       </p:sp>
@@ -1481,10 +1495,10 @@
           <a:bodyPr/>
           <a:lstStyle/>
           <a:p>
-            <a:r>
+            <a:fld id="{8D0E34B1-60A9-433D-BB70-09A40E51C5C9}" type="datetime1">
               <a:rPr lang="de-DE" smtClean="0"/>
               <a:t>20.03.2015</a:t>
-            </a:r>
+            </a:fld>
             <a:endParaRPr lang="de-AT"/>
           </a:p>
         </p:txBody>
@@ -1665,10 +1679,10 @@
           <a:bodyPr/>
           <a:lstStyle/>
           <a:p>
-            <a:r>
+            <a:fld id="{C30B2E29-D4A0-43FE-BF49-52CAF65E0454}" type="datetime1">
               <a:rPr lang="de-DE" smtClean="0"/>
               <a:t>20.03.2015</a:t>
-            </a:r>
+            </a:fld>
             <a:endParaRPr lang="de-AT"/>
           </a:p>
         </p:txBody>
@@ -1839,11 +1853,11 @@
           <a:bodyPr/>
           <a:lstStyle/>
           <a:p>
-            <a:r>
+            <a:fld id="{EA476F3A-562F-4D80-ACC9-BDB7E33CAF81}" type="datetime1">
               <a:rPr lang="de-DE" smtClean="0"/>
               <a:t>20.03.2015</a:t>
-            </a:r>
-            <a:endParaRPr lang="de-AT"/>
+            </a:fld>
+            <a:endParaRPr lang="de-AT" dirty="0"/>
           </a:p>
         </p:txBody>
       </p:sp>
@@ -1863,10 +1877,10 @@
           <a:lstStyle/>
           <a:p>
             <a:r>
-              <a:rPr lang="de-AT" smtClean="0"/>
+              <a:rPr lang="de-AT" dirty="0" smtClean="0"/>
               <a:t>SOA, REST &amp; JSON</a:t>
             </a:r>
-            <a:endParaRPr lang="de-AT"/>
+            <a:endParaRPr lang="de-AT" dirty="0"/>
           </a:p>
         </p:txBody>
       </p:sp>
@@ -1889,7 +1903,7 @@
               <a:rPr lang="de-AT" smtClean="0"/>
               <a:t>‹Nr.›</a:t>
             </a:fld>
-            <a:endParaRPr lang="de-AT"/>
+            <a:endParaRPr lang="de-AT" dirty="0"/>
           </a:p>
         </p:txBody>
       </p:sp>
@@ -2089,10 +2103,10 @@
           <a:bodyPr/>
           <a:lstStyle/>
           <a:p>
-            <a:r>
+            <a:fld id="{79510A05-E766-4C80-A15B-932788F1D9B3}" type="datetime1">
               <a:rPr lang="de-DE" smtClean="0"/>
               <a:t>20.03.2015</a:t>
-            </a:r>
+            </a:fld>
             <a:endParaRPr lang="de-AT"/>
           </a:p>
         </p:txBody>
@@ -2325,10 +2339,10 @@
           <a:bodyPr/>
           <a:lstStyle/>
           <a:p>
-            <a:r>
+            <a:fld id="{4ED7498E-A4A8-4CD2-9436-663F3D86814E}" type="datetime1">
               <a:rPr lang="de-DE" smtClean="0"/>
               <a:t>20.03.2015</a:t>
-            </a:r>
+            </a:fld>
             <a:endParaRPr lang="de-AT"/>
           </a:p>
         </p:txBody>
@@ -2696,10 +2710,10 @@
           <a:bodyPr/>
           <a:lstStyle/>
           <a:p>
-            <a:r>
+            <a:fld id="{E9683238-053C-44F3-87CA-C34E185F6E2F}" type="datetime1">
               <a:rPr lang="de-DE" smtClean="0"/>
               <a:t>20.03.2015</a:t>
-            </a:r>
+            </a:fld>
             <a:endParaRPr lang="de-AT"/>
           </a:p>
         </p:txBody>
@@ -2818,10 +2832,10 @@
           <a:bodyPr/>
           <a:lstStyle/>
           <a:p>
-            <a:r>
+            <a:fld id="{FA631CF8-AEDE-49AD-AEDF-254E53D8EFBF}" type="datetime1">
               <a:rPr lang="de-DE" smtClean="0"/>
               <a:t>20.03.2015</a:t>
-            </a:r>
+            </a:fld>
             <a:endParaRPr lang="de-AT"/>
           </a:p>
         </p:txBody>
@@ -2917,10 +2931,10 @@
           <a:bodyPr/>
           <a:lstStyle/>
           <a:p>
-            <a:r>
+            <a:fld id="{9D080728-1FA9-4CEC-A034-F65135B8348C}" type="datetime1">
               <a:rPr lang="de-DE" smtClean="0"/>
               <a:t>20.03.2015</a:t>
-            </a:r>
+            </a:fld>
             <a:endParaRPr lang="de-AT"/>
           </a:p>
         </p:txBody>
@@ -3198,10 +3212,10 @@
           <a:bodyPr/>
           <a:lstStyle/>
           <a:p>
-            <a:r>
+            <a:fld id="{8ECDF3A6-C7DA-4802-AF25-55BB9269F9CF}" type="datetime1">
               <a:rPr lang="de-DE" smtClean="0"/>
               <a:t>20.03.2015</a:t>
-            </a:r>
+            </a:fld>
             <a:endParaRPr lang="de-AT"/>
           </a:p>
         </p:txBody>
@@ -3455,10 +3469,10 @@
           <a:bodyPr/>
           <a:lstStyle/>
           <a:p>
-            <a:r>
+            <a:fld id="{EC319027-B240-4C22-95F8-C692D9D07967}" type="datetime1">
               <a:rPr lang="de-DE" smtClean="0"/>
               <a:t>20.03.2015</a:t>
-            </a:r>
+            </a:fld>
             <a:endParaRPr lang="de-AT"/>
           </a:p>
         </p:txBody>
@@ -3662,21 +3676,20 @@
           <a:bodyPr vert="horz" lIns="91440" tIns="45720" rIns="91440" bIns="45720" rtlCol="0" anchor="ctr"/>
           <a:lstStyle>
             <a:lvl1pPr algn="l">
-              <a:defRPr sz="1200">
+              <a:defRPr sz="1600">
                 <a:solidFill>
-                  <a:schemeClr val="tx1">
-                    <a:tint val="75000"/>
-                  </a:schemeClr>
+                  <a:schemeClr val="tx1"/>
                 </a:solidFill>
               </a:defRPr>
             </a:lvl1pPr>
           </a:lstStyle>
           <a:p>
-            <a:r>
+            <a:fld id="{10BA9223-3B89-4DF6-B490-582198680A33}" type="datetime1">
               <a:rPr lang="de-DE" smtClean="0"/>
+              <a:pPr/>
               <a:t>20.03.2015</a:t>
-            </a:r>
-            <a:endParaRPr lang="de-AT"/>
+            </a:fld>
+            <a:endParaRPr lang="de-AT" dirty="0"/>
           </a:p>
         </p:txBody>
       </p:sp>
@@ -3703,21 +3716,19 @@
           <a:bodyPr vert="horz" lIns="91440" tIns="45720" rIns="91440" bIns="45720" rtlCol="0" anchor="ctr"/>
           <a:lstStyle>
             <a:lvl1pPr algn="ctr">
-              <a:defRPr sz="1200">
+              <a:defRPr sz="1600">
                 <a:solidFill>
-                  <a:schemeClr val="tx1">
-                    <a:tint val="75000"/>
-                  </a:schemeClr>
+                  <a:schemeClr val="tx1"/>
                 </a:solidFill>
               </a:defRPr>
             </a:lvl1pPr>
           </a:lstStyle>
           <a:p>
             <a:r>
-              <a:rPr lang="de-AT" smtClean="0"/>
+              <a:rPr lang="de-AT" dirty="0" smtClean="0"/>
               <a:t>SOA, REST &amp; JSON</a:t>
             </a:r>
-            <a:endParaRPr lang="de-AT"/>
+            <a:endParaRPr lang="de-AT" dirty="0"/>
           </a:p>
         </p:txBody>
       </p:sp>
@@ -3744,11 +3755,9 @@
           <a:bodyPr vert="horz" lIns="91440" tIns="45720" rIns="91440" bIns="45720" rtlCol="0" anchor="ctr"/>
           <a:lstStyle>
             <a:lvl1pPr algn="r">
-              <a:defRPr sz="1200">
+              <a:defRPr sz="1600">
                 <a:solidFill>
-                  <a:schemeClr val="tx1">
-                    <a:tint val="75000"/>
-                  </a:schemeClr>
+                  <a:schemeClr val="tx1"/>
                 </a:solidFill>
               </a:defRPr>
             </a:lvl1pPr>
@@ -3756,9 +3765,10 @@
           <a:p>
             <a:fld id="{0582A2BA-FDDD-4C1C-9C58-E41C263E2DD2}" type="slidenum">
               <a:rPr lang="de-AT" smtClean="0"/>
+              <a:pPr/>
               <a:t>‹Nr.›</a:t>
             </a:fld>
-            <a:endParaRPr lang="de-AT"/>
+            <a:endParaRPr lang="de-AT" dirty="0"/>
           </a:p>
         </p:txBody>
       </p:sp>
@@ -4184,10 +4194,10 @@
           <a:lstStyle/>
           <a:p>
             <a:r>
-              <a:rPr lang="de-AT" smtClean="0"/>
+              <a:rPr lang="de-AT" dirty="0" smtClean="0"/>
               <a:t>SOA, REST &amp; JSON</a:t>
             </a:r>
-            <a:endParaRPr lang="de-AT"/>
+            <a:endParaRPr lang="de-AT" dirty="0"/>
           </a:p>
         </p:txBody>
       </p:sp>
@@ -4206,11 +4216,11 @@
           <a:bodyPr/>
           <a:lstStyle/>
           <a:p>
-            <a:r>
+            <a:fld id="{78D3ACA6-C849-4C95-B40D-70414C5BE5AD}" type="datetime1">
               <a:rPr lang="de-DE" smtClean="0"/>
               <a:t>20.03.2015</a:t>
-            </a:r>
-            <a:endParaRPr lang="de-AT"/>
+            </a:fld>
+            <a:endParaRPr lang="de-AT" dirty="0"/>
           </a:p>
         </p:txBody>
       </p:sp>
@@ -4238,176 +4248,6 @@
 </file>
 
 <file path=ppt/slides/slide10.xml><?xml version="1.0" encoding="utf-8"?>
-<p:sld xmlns:a="http://schemas.openxmlformats.org/drawingml/2006/main" xmlns:r="http://schemas.openxmlformats.org/officeDocument/2006/relationships" xmlns:p="http://schemas.openxmlformats.org/presentationml/2006/main" show="0">
-  <p:cSld>
-    <p:spTree>
-      <p:nvGrpSpPr>
-        <p:cNvPr id="1" name=""/>
-        <p:cNvGrpSpPr/>
-        <p:nvPr/>
-      </p:nvGrpSpPr>
-      <p:grpSpPr>
-        <a:xfrm>
-          <a:off x="0" y="0"/>
-          <a:ext cx="0" cy="0"/>
-          <a:chOff x="0" y="0"/>
-          <a:chExt cx="0" cy="0"/>
-        </a:xfrm>
-      </p:grpSpPr>
-      <p:sp>
-        <p:nvSpPr>
-          <p:cNvPr id="2" name="Title 1"/>
-          <p:cNvSpPr>
-            <a:spLocks noGrp="1"/>
-          </p:cNvSpPr>
-          <p:nvPr>
-            <p:ph type="title"/>
-          </p:nvPr>
-        </p:nvSpPr>
-        <p:spPr/>
-        <p:txBody>
-          <a:bodyPr/>
-          <a:lstStyle/>
-          <a:p>
-            <a:endParaRPr lang="de-AT"/>
-          </a:p>
-        </p:txBody>
-      </p:sp>
-      <p:sp>
-        <p:nvSpPr>
-          <p:cNvPr id="3" name="Content Placeholder 2"/>
-          <p:cNvSpPr>
-            <a:spLocks noGrp="1"/>
-          </p:cNvSpPr>
-          <p:nvPr>
-            <p:ph idx="1"/>
-          </p:nvPr>
-        </p:nvSpPr>
-        <p:spPr/>
-        <p:txBody>
-          <a:bodyPr/>
-          <a:lstStyle/>
-          <a:p>
-            <a:endParaRPr lang="de-AT"/>
-          </a:p>
-        </p:txBody>
-      </p:sp>
-      <p:pic>
-        <p:nvPicPr>
-          <p:cNvPr id="4" name="Picture 3"/>
-          <p:cNvPicPr>
-            <a:picLocks noChangeAspect="1"/>
-          </p:cNvPicPr>
-          <p:nvPr/>
-        </p:nvPicPr>
-        <p:blipFill rotWithShape="1">
-          <a:blip r:embed="rId2"/>
-          <a:srcRect l="7602" r="35384" b="35255"/>
-          <a:stretch/>
-        </p:blipFill>
-        <p:spPr>
-          <a:xfrm>
-            <a:off x="579549" y="-228600"/>
-            <a:ext cx="7418231" cy="4736206"/>
-          </a:xfrm>
-          <a:prstGeom prst="rect">
-            <a:avLst/>
-          </a:prstGeom>
-        </p:spPr>
-      </p:pic>
-      <p:sp>
-        <p:nvSpPr>
-          <p:cNvPr id="8" name="Foliennummernplatzhalter 7"/>
-          <p:cNvSpPr>
-            <a:spLocks noGrp="1"/>
-          </p:cNvSpPr>
-          <p:nvPr>
-            <p:ph type="sldNum" sz="quarter" idx="12"/>
-          </p:nvPr>
-        </p:nvSpPr>
-        <p:spPr/>
-        <p:txBody>
-          <a:bodyPr/>
-          <a:lstStyle/>
-          <a:p>
-            <a:fld id="{0582A2BA-FDDD-4C1C-9C58-E41C263E2DD2}" type="slidenum">
-              <a:rPr lang="de-AT" smtClean="0"/>
-              <a:t>10</a:t>
-            </a:fld>
-            <a:endParaRPr lang="de-AT"/>
-          </a:p>
-        </p:txBody>
-      </p:sp>
-      <p:sp>
-        <p:nvSpPr>
-          <p:cNvPr id="9" name="Fußzeilenplatzhalter 8"/>
-          <p:cNvSpPr>
-            <a:spLocks noGrp="1"/>
-          </p:cNvSpPr>
-          <p:nvPr>
-            <p:ph type="ftr" sz="quarter" idx="11"/>
-          </p:nvPr>
-        </p:nvSpPr>
-        <p:spPr/>
-        <p:txBody>
-          <a:bodyPr/>
-          <a:lstStyle/>
-          <a:p>
-            <a:r>
-              <a:rPr lang="de-AT" smtClean="0"/>
-              <a:t>SOA, REST &amp; JSON</a:t>
-            </a:r>
-            <a:endParaRPr lang="de-AT"/>
-          </a:p>
-        </p:txBody>
-      </p:sp>
-      <p:sp>
-        <p:nvSpPr>
-          <p:cNvPr id="10" name="Datumsplatzhalter 9"/>
-          <p:cNvSpPr>
-            <a:spLocks noGrp="1"/>
-          </p:cNvSpPr>
-          <p:nvPr>
-            <p:ph type="dt" sz="half" idx="10"/>
-          </p:nvPr>
-        </p:nvSpPr>
-        <p:spPr/>
-        <p:txBody>
-          <a:bodyPr/>
-          <a:lstStyle/>
-          <a:p>
-            <a:r>
-              <a:rPr lang="de-DE" smtClean="0"/>
-              <a:t>20.03.2015</a:t>
-            </a:r>
-            <a:endParaRPr lang="de-AT"/>
-          </a:p>
-        </p:txBody>
-      </p:sp>
-    </p:spTree>
-    <p:extLst>
-      <p:ext uri="{BB962C8B-B14F-4D97-AF65-F5344CB8AC3E}">
-        <p14:creationId xmlns:p14="http://schemas.microsoft.com/office/powerpoint/2010/main" val="2173474422"/>
-      </p:ext>
-    </p:extLst>
-  </p:cSld>
-  <p:clrMapOvr>
-    <a:masterClrMapping/>
-  </p:clrMapOvr>
-  <p:transition spd="slow">
-    <p:push dir="u"/>
-  </p:transition>
-  <p:timing>
-    <p:tnLst>
-      <p:par>
-        <p:cTn id="1" dur="indefinite" restart="never" nodeType="tmRoot"/>
-      </p:par>
-    </p:tnLst>
-  </p:timing>
-</p:sld>
-</file>
-
-<file path=ppt/slides/slide11.xml><?xml version="1.0" encoding="utf-8"?>
 <p:sld xmlns:a="http://schemas.openxmlformats.org/drawingml/2006/main" xmlns:r="http://schemas.openxmlformats.org/officeDocument/2006/relationships" xmlns:p="http://schemas.openxmlformats.org/presentationml/2006/main">
   <p:cSld>
     <p:spTree>
@@ -4822,7 +4662,7 @@
           <a:p>
             <a:fld id="{0582A2BA-FDDD-4C1C-9C58-E41C263E2DD2}" type="slidenum">
               <a:rPr lang="de-AT" smtClean="0"/>
-              <a:t>11</a:t>
+              <a:t>10</a:t>
             </a:fld>
             <a:endParaRPr lang="de-AT"/>
           </a:p>
@@ -4866,10 +4706,10 @@
           <a:bodyPr/>
           <a:lstStyle/>
           <a:p>
-            <a:r>
+            <a:fld id="{4C4045FB-B6E9-464A-A70C-671DD6CD222B}" type="datetime1">
               <a:rPr lang="de-DE" smtClean="0"/>
               <a:t>20.03.2015</a:t>
-            </a:r>
+            </a:fld>
             <a:endParaRPr lang="de-AT"/>
           </a:p>
         </p:txBody>
@@ -5556,7 +5396,7 @@
 </p:sld>
 </file>
 
-<file path=ppt/slides/slide12.xml><?xml version="1.0" encoding="utf-8"?>
+<file path=ppt/slides/slide11.xml><?xml version="1.0" encoding="utf-8"?>
 <p:sld xmlns:a="http://schemas.openxmlformats.org/drawingml/2006/main" xmlns:r="http://schemas.openxmlformats.org/officeDocument/2006/relationships" xmlns:p="http://schemas.openxmlformats.org/presentationml/2006/main" show="0">
   <p:cSld>
     <p:spTree>
@@ -5651,7 +5491,7 @@
           <a:p>
             <a:fld id="{0582A2BA-FDDD-4C1C-9C58-E41C263E2DD2}" type="slidenum">
               <a:rPr lang="de-AT" smtClean="0"/>
-              <a:t>12</a:t>
+              <a:t>11</a:t>
             </a:fld>
             <a:endParaRPr lang="de-AT"/>
           </a:p>
@@ -5695,10 +5535,10 @@
           <a:bodyPr/>
           <a:lstStyle/>
           <a:p>
-            <a:r>
+            <a:fld id="{8CCF4FB1-EF0E-4C54-AE9E-49E6EF020473}" type="datetime1">
               <a:rPr lang="de-DE" smtClean="0"/>
               <a:t>20.03.2015</a:t>
-            </a:r>
+            </a:fld>
             <a:endParaRPr lang="de-AT"/>
           </a:p>
         </p:txBody>
@@ -5707,6 +5547,163 @@
     <p:extLst>
       <p:ext uri="{BB962C8B-B14F-4D97-AF65-F5344CB8AC3E}">
         <p14:creationId xmlns:p14="http://schemas.microsoft.com/office/powerpoint/2010/main" val="2901394838"/>
+      </p:ext>
+    </p:extLst>
+  </p:cSld>
+  <p:clrMapOvr>
+    <a:masterClrMapping/>
+  </p:clrMapOvr>
+  <p:transition spd="slow">
+    <p:push dir="u"/>
+  </p:transition>
+  <p:timing>
+    <p:tnLst>
+      <p:par>
+        <p:cTn id="1" dur="indefinite" restart="never" nodeType="tmRoot"/>
+      </p:par>
+    </p:tnLst>
+  </p:timing>
+</p:sld>
+</file>
+
+<file path=ppt/slides/slide12.xml><?xml version="1.0" encoding="utf-8"?>
+<p:sld xmlns:a="http://schemas.openxmlformats.org/drawingml/2006/main" xmlns:r="http://schemas.openxmlformats.org/officeDocument/2006/relationships" xmlns:p="http://schemas.openxmlformats.org/presentationml/2006/main">
+  <p:cSld>
+    <p:spTree>
+      <p:nvGrpSpPr>
+        <p:cNvPr id="1" name=""/>
+        <p:cNvGrpSpPr/>
+        <p:nvPr/>
+      </p:nvGrpSpPr>
+      <p:grpSpPr>
+        <a:xfrm>
+          <a:off x="0" y="0"/>
+          <a:ext cx="0" cy="0"/>
+          <a:chOff x="0" y="0"/>
+          <a:chExt cx="0" cy="0"/>
+        </a:xfrm>
+      </p:grpSpPr>
+      <p:pic>
+        <p:nvPicPr>
+          <p:cNvPr id="4" name="Content Placeholder 3"/>
+          <p:cNvPicPr>
+            <a:picLocks noGrp="1" noChangeAspect="1"/>
+          </p:cNvPicPr>
+          <p:nvPr>
+            <p:ph idx="1"/>
+          </p:nvPr>
+        </p:nvPicPr>
+        <p:blipFill>
+          <a:blip r:embed="rId2">
+            <a:extLst>
+              <a:ext uri="{28A0092B-C50C-407E-A947-70E740481C1C}">
+                <a14:useLocalDpi xmlns:a14="http://schemas.microsoft.com/office/drawing/2010/main" val="0"/>
+              </a:ext>
+            </a:extLst>
+          </a:blip>
+          <a:stretch>
+            <a:fillRect/>
+          </a:stretch>
+        </p:blipFill>
+        <p:spPr>
+          <a:xfrm>
+            <a:off x="3186698" y="-375305"/>
+            <a:ext cx="6795501" cy="7096780"/>
+          </a:xfrm>
+        </p:spPr>
+      </p:pic>
+      <p:sp>
+        <p:nvSpPr>
+          <p:cNvPr id="2" name="Title 1"/>
+          <p:cNvSpPr>
+            <a:spLocks noGrp="1"/>
+          </p:cNvSpPr>
+          <p:nvPr>
+            <p:ph type="title"/>
+          </p:nvPr>
+        </p:nvSpPr>
+        <p:spPr/>
+        <p:txBody>
+          <a:bodyPr/>
+          <a:lstStyle/>
+          <a:p>
+            <a:endParaRPr lang="de-AT"/>
+          </a:p>
+        </p:txBody>
+      </p:sp>
+      <p:sp>
+        <p:nvSpPr>
+          <p:cNvPr id="3" name="Foliennummernplatzhalter 2"/>
+          <p:cNvSpPr>
+            <a:spLocks noGrp="1"/>
+          </p:cNvSpPr>
+          <p:nvPr>
+            <p:ph type="sldNum" sz="quarter" idx="12"/>
+          </p:nvPr>
+        </p:nvSpPr>
+        <p:spPr/>
+        <p:txBody>
+          <a:bodyPr/>
+          <a:lstStyle/>
+          <a:p>
+            <a:fld id="{0582A2BA-FDDD-4C1C-9C58-E41C263E2DD2}" type="slidenum">
+              <a:rPr lang="de-AT" smtClean="0"/>
+              <a:t>12</a:t>
+            </a:fld>
+            <a:endParaRPr lang="de-AT"/>
+          </a:p>
+        </p:txBody>
+      </p:sp>
+      <p:sp>
+        <p:nvSpPr>
+          <p:cNvPr id="8" name="Fußzeilenplatzhalter 7"/>
+          <p:cNvSpPr>
+            <a:spLocks noGrp="1"/>
+          </p:cNvSpPr>
+          <p:nvPr>
+            <p:ph type="ftr" sz="quarter" idx="11"/>
+          </p:nvPr>
+        </p:nvSpPr>
+        <p:spPr/>
+        <p:txBody>
+          <a:bodyPr/>
+          <a:lstStyle/>
+          <a:p>
+            <a:r>
+              <a:rPr lang="de-AT" smtClean="0"/>
+              <a:t>SOA, REST &amp; JSON</a:t>
+            </a:r>
+            <a:endParaRPr lang="de-AT"/>
+          </a:p>
+        </p:txBody>
+      </p:sp>
+      <p:sp>
+        <p:nvSpPr>
+          <p:cNvPr id="9" name="Datumsplatzhalter 8"/>
+          <p:cNvSpPr>
+            <a:spLocks noGrp="1"/>
+          </p:cNvSpPr>
+          <p:nvPr>
+            <p:ph type="dt" sz="half" idx="10"/>
+          </p:nvPr>
+        </p:nvSpPr>
+        <p:spPr/>
+        <p:txBody>
+          <a:bodyPr/>
+          <a:lstStyle/>
+          <a:p>
+            <a:fld id="{EBD2C46A-D96D-4AA7-A968-2692E4D18BA4}" type="datetime1">
+              <a:rPr lang="de-DE" smtClean="0"/>
+              <a:t>20.03.2015</a:t>
+            </a:fld>
+            <a:endParaRPr lang="de-AT"/>
+          </a:p>
+        </p:txBody>
+      </p:sp>
+    </p:spTree>
+    <p:extLst>
+      <p:ext uri="{BB962C8B-B14F-4D97-AF65-F5344CB8AC3E}">
+        <p14:creationId xmlns:p14="http://schemas.microsoft.com/office/powerpoint/2010/main" val="4215237943"/>
       </p:ext>
     </p:extLst>
   </p:cSld>
@@ -5743,57 +5740,96 @@
           <a:chExt cx="0" cy="0"/>
         </a:xfrm>
       </p:grpSpPr>
-      <p:pic>
-        <p:nvPicPr>
-          <p:cNvPr id="4" name="Content Placeholder 3"/>
-          <p:cNvPicPr>
-            <a:picLocks noGrp="1" noChangeAspect="1"/>
-          </p:cNvPicPr>
+      <p:sp>
+        <p:nvSpPr>
+          <p:cNvPr id="2" name="Title 1"/>
+          <p:cNvSpPr>
+            <a:spLocks noGrp="1"/>
+          </p:cNvSpPr>
+          <p:nvPr>
+            <p:ph type="title"/>
+          </p:nvPr>
+        </p:nvSpPr>
+        <p:spPr/>
+        <p:txBody>
+          <a:bodyPr/>
+          <a:lstStyle/>
+          <a:p>
+            <a:r>
+              <a:rPr lang="de-AT" dirty="0" smtClean="0"/>
+              <a:t>Orchestration</a:t>
+            </a:r>
+            <a:endParaRPr lang="de-AT" dirty="0"/>
+          </a:p>
+        </p:txBody>
+      </p:sp>
+      <p:sp>
+        <p:nvSpPr>
+          <p:cNvPr id="3" name="Content Placeholder 2"/>
+          <p:cNvSpPr>
+            <a:spLocks noGrp="1"/>
+          </p:cNvSpPr>
           <p:nvPr>
             <p:ph idx="1"/>
           </p:nvPr>
-        </p:nvPicPr>
-        <p:blipFill>
-          <a:blip r:embed="rId2">
-            <a:extLst>
-              <a:ext uri="{28A0092B-C50C-407E-A947-70E740481C1C}">
-                <a14:useLocalDpi xmlns:a14="http://schemas.microsoft.com/office/drawing/2010/main" val="0"/>
-              </a:ext>
-            </a:extLst>
-          </a:blip>
-          <a:stretch>
-            <a:fillRect/>
-          </a:stretch>
-        </p:blipFill>
-        <p:spPr>
-          <a:xfrm>
-            <a:off x="3186698" y="-375305"/>
-            <a:ext cx="6795501" cy="7096780"/>
-          </a:xfrm>
-        </p:spPr>
-      </p:pic>
-      <p:sp>
-        <p:nvSpPr>
-          <p:cNvPr id="2" name="Title 1"/>
-          <p:cNvSpPr>
-            <a:spLocks noGrp="1"/>
-          </p:cNvSpPr>
-          <p:nvPr>
-            <p:ph type="title"/>
-          </p:nvPr>
-        </p:nvSpPr>
-        <p:spPr/>
-        <p:txBody>
-          <a:bodyPr/>
-          <a:lstStyle/>
-          <a:p>
-            <a:endParaRPr lang="de-AT"/>
-          </a:p>
-        </p:txBody>
-      </p:sp>
-      <p:sp>
-        <p:nvSpPr>
-          <p:cNvPr id="3" name="Foliennummernplatzhalter 2"/>
+        </p:nvSpPr>
+        <p:spPr/>
+        <p:txBody>
+          <a:bodyPr>
+            <a:normAutofit/>
+          </a:bodyPr>
+          <a:lstStyle/>
+          <a:p>
+            <a:r>
+              <a:rPr lang="de-AT" dirty="0" smtClean="0"/>
+              <a:t>BPEL</a:t>
+            </a:r>
+          </a:p>
+          <a:p>
+            <a:endParaRPr lang="de-AT" sz="800" dirty="0"/>
+          </a:p>
+          <a:p>
+            <a:r>
+              <a:rPr lang="de-AT" dirty="0" smtClean="0"/>
+              <a:t>Graphically composing services from a very business process view</a:t>
+            </a:r>
+          </a:p>
+          <a:p>
+            <a:endParaRPr lang="de-AT" sz="800" dirty="0"/>
+          </a:p>
+          <a:p>
+            <a:r>
+              <a:rPr lang="de-AT" dirty="0" smtClean="0"/>
+              <a:t>Generating new processes without coding</a:t>
+            </a:r>
+          </a:p>
+          <a:p>
+            <a:endParaRPr lang="de-AT" sz="800" dirty="0"/>
+          </a:p>
+          <a:p>
+            <a:r>
+              <a:rPr lang="de-AT" dirty="0" smtClean="0"/>
+              <a:t>Generating compositions</a:t>
+            </a:r>
+          </a:p>
+          <a:p>
+            <a:endParaRPr lang="de-AT" sz="800" dirty="0" smtClean="0"/>
+          </a:p>
+          <a:p>
+            <a:r>
+              <a:rPr lang="de-AT" dirty="0" smtClean="0"/>
+              <a:t>Power of SOA</a:t>
+            </a:r>
+            <a:endParaRPr lang="de-AT" dirty="0"/>
+          </a:p>
+          <a:p>
+            <a:endParaRPr lang="de-AT" dirty="0"/>
+          </a:p>
+        </p:txBody>
+      </p:sp>
+      <p:sp>
+        <p:nvSpPr>
+          <p:cNvPr id="4" name="Foliennummernplatzhalter 3"/>
           <p:cNvSpPr>
             <a:spLocks noGrp="1"/>
           </p:cNvSpPr>
@@ -5852,206 +5888,10 @@
           <a:bodyPr/>
           <a:lstStyle/>
           <a:p>
-            <a:r>
+            <a:fld id="{28D23C10-9CB0-42E5-9600-9C9AFEA5AAC2}" type="datetime1">
               <a:rPr lang="de-DE" smtClean="0"/>
               <a:t>20.03.2015</a:t>
-            </a:r>
-            <a:endParaRPr lang="de-AT"/>
-          </a:p>
-        </p:txBody>
-      </p:sp>
-    </p:spTree>
-    <p:extLst>
-      <p:ext uri="{BB962C8B-B14F-4D97-AF65-F5344CB8AC3E}">
-        <p14:creationId xmlns:p14="http://schemas.microsoft.com/office/powerpoint/2010/main" val="4215237943"/>
-      </p:ext>
-    </p:extLst>
-  </p:cSld>
-  <p:clrMapOvr>
-    <a:masterClrMapping/>
-  </p:clrMapOvr>
-  <p:transition spd="slow">
-    <p:push dir="u"/>
-  </p:transition>
-  <p:timing>
-    <p:tnLst>
-      <p:par>
-        <p:cTn id="1" dur="indefinite" restart="never" nodeType="tmRoot"/>
-      </p:par>
-    </p:tnLst>
-  </p:timing>
-</p:sld>
-</file>
-
-<file path=ppt/slides/slide14.xml><?xml version="1.0" encoding="utf-8"?>
-<p:sld xmlns:a="http://schemas.openxmlformats.org/drawingml/2006/main" xmlns:r="http://schemas.openxmlformats.org/officeDocument/2006/relationships" xmlns:p="http://schemas.openxmlformats.org/presentationml/2006/main">
-  <p:cSld>
-    <p:spTree>
-      <p:nvGrpSpPr>
-        <p:cNvPr id="1" name=""/>
-        <p:cNvGrpSpPr/>
-        <p:nvPr/>
-      </p:nvGrpSpPr>
-      <p:grpSpPr>
-        <a:xfrm>
-          <a:off x="0" y="0"/>
-          <a:ext cx="0" cy="0"/>
-          <a:chOff x="0" y="0"/>
-          <a:chExt cx="0" cy="0"/>
-        </a:xfrm>
-      </p:grpSpPr>
-      <p:sp>
-        <p:nvSpPr>
-          <p:cNvPr id="2" name="Title 1"/>
-          <p:cNvSpPr>
-            <a:spLocks noGrp="1"/>
-          </p:cNvSpPr>
-          <p:nvPr>
-            <p:ph type="title"/>
-          </p:nvPr>
-        </p:nvSpPr>
-        <p:spPr/>
-        <p:txBody>
-          <a:bodyPr/>
-          <a:lstStyle/>
-          <a:p>
-            <a:r>
-              <a:rPr lang="de-AT" dirty="0" smtClean="0"/>
-              <a:t>Orchestration</a:t>
-            </a:r>
-            <a:endParaRPr lang="de-AT" dirty="0"/>
-          </a:p>
-        </p:txBody>
-      </p:sp>
-      <p:sp>
-        <p:nvSpPr>
-          <p:cNvPr id="3" name="Content Placeholder 2"/>
-          <p:cNvSpPr>
-            <a:spLocks noGrp="1"/>
-          </p:cNvSpPr>
-          <p:nvPr>
-            <p:ph idx="1"/>
-          </p:nvPr>
-        </p:nvSpPr>
-        <p:spPr/>
-        <p:txBody>
-          <a:bodyPr>
-            <a:normAutofit/>
-          </a:bodyPr>
-          <a:lstStyle/>
-          <a:p>
-            <a:r>
-              <a:rPr lang="de-AT" dirty="0" smtClean="0"/>
-              <a:t>BPEL</a:t>
-            </a:r>
-          </a:p>
-          <a:p>
-            <a:endParaRPr lang="de-AT" sz="800" dirty="0"/>
-          </a:p>
-          <a:p>
-            <a:r>
-              <a:rPr lang="de-AT" dirty="0" smtClean="0"/>
-              <a:t>Graphically composing services from a very business process view</a:t>
-            </a:r>
-          </a:p>
-          <a:p>
-            <a:endParaRPr lang="de-AT" sz="800" dirty="0"/>
-          </a:p>
-          <a:p>
-            <a:r>
-              <a:rPr lang="de-AT" dirty="0" smtClean="0"/>
-              <a:t>Generating new processes without coding</a:t>
-            </a:r>
-          </a:p>
-          <a:p>
-            <a:endParaRPr lang="de-AT" sz="800" dirty="0"/>
-          </a:p>
-          <a:p>
-            <a:r>
-              <a:rPr lang="de-AT" dirty="0" smtClean="0"/>
-              <a:t>Generating compositions</a:t>
-            </a:r>
-          </a:p>
-          <a:p>
-            <a:endParaRPr lang="de-AT" sz="800" dirty="0" smtClean="0"/>
-          </a:p>
-          <a:p>
-            <a:r>
-              <a:rPr lang="de-AT" dirty="0" smtClean="0"/>
-              <a:t>Power of SOA</a:t>
-            </a:r>
-            <a:endParaRPr lang="de-AT" dirty="0"/>
-          </a:p>
-          <a:p>
-            <a:endParaRPr lang="de-AT" dirty="0"/>
-          </a:p>
-        </p:txBody>
-      </p:sp>
-      <p:sp>
-        <p:nvSpPr>
-          <p:cNvPr id="4" name="Foliennummernplatzhalter 3"/>
-          <p:cNvSpPr>
-            <a:spLocks noGrp="1"/>
-          </p:cNvSpPr>
-          <p:nvPr>
-            <p:ph type="sldNum" sz="quarter" idx="12"/>
-          </p:nvPr>
-        </p:nvSpPr>
-        <p:spPr/>
-        <p:txBody>
-          <a:bodyPr/>
-          <a:lstStyle/>
-          <a:p>
-            <a:fld id="{0582A2BA-FDDD-4C1C-9C58-E41C263E2DD2}" type="slidenum">
-              <a:rPr lang="de-AT" smtClean="0"/>
-              <a:t>14</a:t>
             </a:fld>
-            <a:endParaRPr lang="de-AT"/>
-          </a:p>
-        </p:txBody>
-      </p:sp>
-      <p:sp>
-        <p:nvSpPr>
-          <p:cNvPr id="8" name="Fußzeilenplatzhalter 7"/>
-          <p:cNvSpPr>
-            <a:spLocks noGrp="1"/>
-          </p:cNvSpPr>
-          <p:nvPr>
-            <p:ph type="ftr" sz="quarter" idx="11"/>
-          </p:nvPr>
-        </p:nvSpPr>
-        <p:spPr/>
-        <p:txBody>
-          <a:bodyPr/>
-          <a:lstStyle/>
-          <a:p>
-            <a:r>
-              <a:rPr lang="de-AT" smtClean="0"/>
-              <a:t>SOA, REST &amp; JSON</a:t>
-            </a:r>
-            <a:endParaRPr lang="de-AT"/>
-          </a:p>
-        </p:txBody>
-      </p:sp>
-      <p:sp>
-        <p:nvSpPr>
-          <p:cNvPr id="9" name="Datumsplatzhalter 8"/>
-          <p:cNvSpPr>
-            <a:spLocks noGrp="1"/>
-          </p:cNvSpPr>
-          <p:nvPr>
-            <p:ph type="dt" sz="half" idx="10"/>
-          </p:nvPr>
-        </p:nvSpPr>
-        <p:spPr/>
-        <p:txBody>
-          <a:bodyPr/>
-          <a:lstStyle/>
-          <a:p>
-            <a:r>
-              <a:rPr lang="de-DE" smtClean="0"/>
-              <a:t>20.03.2015</a:t>
-            </a:r>
             <a:endParaRPr lang="de-AT"/>
           </a:p>
         </p:txBody>
@@ -6079,7 +5919,7 @@
 </p:sld>
 </file>
 
-<file path=ppt/slides/slide15.xml><?xml version="1.0" encoding="utf-8"?>
+<file path=ppt/slides/slide14.xml><?xml version="1.0" encoding="utf-8"?>
 <p:sld xmlns:a="http://schemas.openxmlformats.org/drawingml/2006/main" xmlns:r="http://schemas.openxmlformats.org/officeDocument/2006/relationships" xmlns:p="http://schemas.openxmlformats.org/presentationml/2006/main">
   <p:cSld>
     <p:spTree>
@@ -6195,7 +6035,7 @@
           <a:p>
             <a:fld id="{0582A2BA-FDDD-4C1C-9C58-E41C263E2DD2}" type="slidenum">
               <a:rPr lang="de-AT" smtClean="0"/>
-              <a:t>15</a:t>
+              <a:t>14</a:t>
             </a:fld>
             <a:endParaRPr lang="de-AT"/>
           </a:p>
@@ -6239,10 +6079,10 @@
           <a:bodyPr/>
           <a:lstStyle/>
           <a:p>
-            <a:r>
+            <a:fld id="{6F4971DF-33A8-4FD1-A9E6-B33ADC64C72E}" type="datetime1">
               <a:rPr lang="de-DE" smtClean="0"/>
               <a:t>20.03.2015</a:t>
-            </a:r>
+            </a:fld>
             <a:endParaRPr lang="de-AT"/>
           </a:p>
         </p:txBody>
@@ -6264,6 +6104,442 @@
     <p:tnLst>
       <p:par>
         <p:cTn id="1" dur="indefinite" restart="never" nodeType="tmRoot"/>
+      </p:par>
+    </p:tnLst>
+  </p:timing>
+</p:sld>
+</file>
+
+<file path=ppt/slides/slide15.xml><?xml version="1.0" encoding="utf-8"?>
+<p:sld xmlns:a="http://schemas.openxmlformats.org/drawingml/2006/main" xmlns:r="http://schemas.openxmlformats.org/officeDocument/2006/relationships" xmlns:p="http://schemas.openxmlformats.org/presentationml/2006/main">
+  <p:cSld>
+    <p:spTree>
+      <p:nvGrpSpPr>
+        <p:cNvPr id="1" name=""/>
+        <p:cNvGrpSpPr/>
+        <p:nvPr/>
+      </p:nvGrpSpPr>
+      <p:grpSpPr>
+        <a:xfrm>
+          <a:off x="0" y="0"/>
+          <a:ext cx="0" cy="0"/>
+          <a:chOff x="0" y="0"/>
+          <a:chExt cx="0" cy="0"/>
+        </a:xfrm>
+      </p:grpSpPr>
+      <p:sp>
+        <p:nvSpPr>
+          <p:cNvPr id="4" name="Content Placeholder 3"/>
+          <p:cNvSpPr>
+            <a:spLocks noGrp="1"/>
+          </p:cNvSpPr>
+          <p:nvPr>
+            <p:ph idx="1"/>
+          </p:nvPr>
+        </p:nvSpPr>
+        <p:spPr/>
+        <p:txBody>
+          <a:bodyPr/>
+          <a:lstStyle/>
+          <a:p>
+            <a:r>
+              <a:rPr lang="de-AT" dirty="0" smtClean="0"/>
+              <a:t>Normal Lifcycle + Service Lifecycle</a:t>
+            </a:r>
+          </a:p>
+          <a:p>
+            <a:endParaRPr lang="de-AT" sz="800" dirty="0" smtClean="0"/>
+          </a:p>
+          <a:p>
+            <a:r>
+              <a:rPr lang="de-AT" dirty="0" smtClean="0"/>
+              <a:t>Differences from normal software development:</a:t>
+            </a:r>
+          </a:p>
+          <a:p>
+            <a:pPr lvl="1"/>
+            <a:r>
+              <a:rPr lang="de-AT" dirty="0" smtClean="0"/>
+              <a:t>Identifying the Business Process</a:t>
+            </a:r>
+          </a:p>
+          <a:p>
+            <a:pPr lvl="1"/>
+            <a:r>
+              <a:rPr lang="de-AT" dirty="0" smtClean="0"/>
+              <a:t>Build and compose </a:t>
+            </a:r>
+          </a:p>
+          <a:p>
+            <a:pPr lvl="1"/>
+            <a:r>
+              <a:rPr lang="de-AT" dirty="0" smtClean="0"/>
+              <a:t>Change</a:t>
+            </a:r>
+          </a:p>
+          <a:p>
+            <a:pPr lvl="1"/>
+            <a:r>
+              <a:rPr lang="de-AT" dirty="0" smtClean="0"/>
+              <a:t>Retirement</a:t>
+            </a:r>
+            <a:endParaRPr lang="de-AT" dirty="0"/>
+          </a:p>
+          <a:p>
+            <a:endParaRPr lang="de-AT" dirty="0"/>
+          </a:p>
+        </p:txBody>
+      </p:sp>
+      <p:pic>
+        <p:nvPicPr>
+          <p:cNvPr id="8" name="Picture 7"/>
+          <p:cNvPicPr>
+            <a:picLocks noChangeAspect="1"/>
+          </p:cNvPicPr>
+          <p:nvPr/>
+        </p:nvPicPr>
+        <p:blipFill rotWithShape="1">
+          <a:blip r:embed="rId2">
+            <a:extLst>
+              <a:ext uri="{28A0092B-C50C-407E-A947-70E740481C1C}">
+                <a14:useLocalDpi xmlns:a14="http://schemas.microsoft.com/office/drawing/2010/main" val="0"/>
+              </a:ext>
+            </a:extLst>
+          </a:blip>
+          <a:srcRect b="37085"/>
+          <a:stretch/>
+        </p:blipFill>
+        <p:spPr>
+          <a:xfrm>
+            <a:off x="227347" y="1162654"/>
+            <a:ext cx="9110909" cy="5184373"/>
+          </a:xfrm>
+          <a:prstGeom prst="rect">
+            <a:avLst/>
+          </a:prstGeom>
+        </p:spPr>
+      </p:pic>
+      <p:sp>
+        <p:nvSpPr>
+          <p:cNvPr id="2" name="Title 1"/>
+          <p:cNvSpPr>
+            <a:spLocks noGrp="1"/>
+          </p:cNvSpPr>
+          <p:nvPr>
+            <p:ph type="title"/>
+          </p:nvPr>
+        </p:nvSpPr>
+        <p:spPr/>
+        <p:txBody>
+          <a:bodyPr/>
+          <a:lstStyle/>
+          <a:p>
+            <a:r>
+              <a:rPr lang="de-AT" dirty="0" err="1" smtClean="0"/>
+              <a:t>Lifecycle</a:t>
+            </a:r>
+            <a:endParaRPr lang="de-AT" dirty="0"/>
+          </a:p>
+        </p:txBody>
+      </p:sp>
+      <p:pic>
+        <p:nvPicPr>
+          <p:cNvPr id="3" name="Picture 2"/>
+          <p:cNvPicPr>
+            <a:picLocks noChangeAspect="1"/>
+          </p:cNvPicPr>
+          <p:nvPr/>
+        </p:nvPicPr>
+        <p:blipFill>
+          <a:blip r:embed="rId2">
+            <a:extLst>
+              <a:ext uri="{28A0092B-C50C-407E-A947-70E740481C1C}">
+                <a14:useLocalDpi xmlns:a14="http://schemas.microsoft.com/office/drawing/2010/main" val="0"/>
+              </a:ext>
+            </a:extLst>
+          </a:blip>
+          <a:stretch>
+            <a:fillRect/>
+          </a:stretch>
+        </p:blipFill>
+        <p:spPr>
+          <a:xfrm>
+            <a:off x="5918915" y="628370"/>
+            <a:ext cx="5582429" cy="5048955"/>
+          </a:xfrm>
+          <a:prstGeom prst="rect">
+            <a:avLst/>
+          </a:prstGeom>
+        </p:spPr>
+      </p:pic>
+      <p:sp>
+        <p:nvSpPr>
+          <p:cNvPr id="9" name="Foliennummernplatzhalter 8"/>
+          <p:cNvSpPr>
+            <a:spLocks noGrp="1"/>
+          </p:cNvSpPr>
+          <p:nvPr>
+            <p:ph type="sldNum" sz="quarter" idx="12"/>
+          </p:nvPr>
+        </p:nvSpPr>
+        <p:spPr/>
+        <p:txBody>
+          <a:bodyPr/>
+          <a:lstStyle/>
+          <a:p>
+            <a:fld id="{0582A2BA-FDDD-4C1C-9C58-E41C263E2DD2}" type="slidenum">
+              <a:rPr lang="de-AT" smtClean="0"/>
+              <a:t>15</a:t>
+            </a:fld>
+            <a:endParaRPr lang="de-AT"/>
+          </a:p>
+        </p:txBody>
+      </p:sp>
+      <p:sp>
+        <p:nvSpPr>
+          <p:cNvPr id="10" name="Fußzeilenplatzhalter 9"/>
+          <p:cNvSpPr>
+            <a:spLocks noGrp="1"/>
+          </p:cNvSpPr>
+          <p:nvPr>
+            <p:ph type="ftr" sz="quarter" idx="11"/>
+          </p:nvPr>
+        </p:nvSpPr>
+        <p:spPr/>
+        <p:txBody>
+          <a:bodyPr/>
+          <a:lstStyle/>
+          <a:p>
+            <a:r>
+              <a:rPr lang="de-AT" smtClean="0"/>
+              <a:t>SOA, REST &amp; JSON</a:t>
+            </a:r>
+            <a:endParaRPr lang="de-AT"/>
+          </a:p>
+        </p:txBody>
+      </p:sp>
+      <p:sp>
+        <p:nvSpPr>
+          <p:cNvPr id="11" name="Datumsplatzhalter 10"/>
+          <p:cNvSpPr>
+            <a:spLocks noGrp="1"/>
+          </p:cNvSpPr>
+          <p:nvPr>
+            <p:ph type="dt" sz="half" idx="10"/>
+          </p:nvPr>
+        </p:nvSpPr>
+        <p:spPr/>
+        <p:txBody>
+          <a:bodyPr/>
+          <a:lstStyle/>
+          <a:p>
+            <a:fld id="{9DBF8C9C-9278-496A-8E05-0ADABC1B0715}" type="datetime1">
+              <a:rPr lang="de-DE" smtClean="0"/>
+              <a:t>20.03.2015</a:t>
+            </a:fld>
+            <a:endParaRPr lang="de-AT"/>
+          </a:p>
+        </p:txBody>
+      </p:sp>
+    </p:spTree>
+    <p:extLst>
+      <p:ext uri="{BB962C8B-B14F-4D97-AF65-F5344CB8AC3E}">
+        <p14:creationId xmlns:p14="http://schemas.microsoft.com/office/powerpoint/2010/main" val="2296427799"/>
+      </p:ext>
+    </p:extLst>
+  </p:cSld>
+  <p:clrMapOvr>
+    <a:masterClrMapping/>
+  </p:clrMapOvr>
+  <p:transition spd="slow">
+    <p:push dir="u"/>
+  </p:transition>
+  <p:timing>
+    <p:tnLst>
+      <p:par>
+        <p:cTn id="1" dur="indefinite" restart="never" nodeType="tmRoot">
+          <p:childTnLst>
+            <p:seq concurrent="1" nextAc="seek">
+              <p:cTn id="2" dur="indefinite" nodeType="mainSeq">
+                <p:childTnLst>
+                  <p:par>
+                    <p:cTn id="3" fill="hold">
+                      <p:stCondLst>
+                        <p:cond delay="indefinite"/>
+                      </p:stCondLst>
+                      <p:childTnLst>
+                        <p:par>
+                          <p:cTn id="4" fill="hold">
+                            <p:stCondLst>
+                              <p:cond delay="0"/>
+                            </p:stCondLst>
+                            <p:childTnLst>
+                              <p:par>
+                                <p:cTn id="5" presetID="10" presetClass="entr" presetSubtype="0" fill="hold" nodeType="clickEffect">
+                                  <p:stCondLst>
+                                    <p:cond delay="0"/>
+                                  </p:stCondLst>
+                                  <p:childTnLst>
+                                    <p:set>
+                                      <p:cBhvr>
+                                        <p:cTn id="6" dur="1" fill="hold">
+                                          <p:stCondLst>
+                                            <p:cond delay="0"/>
+                                          </p:stCondLst>
+                                        </p:cTn>
+                                        <p:tgtEl>
+                                          <p:spTgt spid="8"/>
+                                        </p:tgtEl>
+                                        <p:attrNameLst>
+                                          <p:attrName>style.visibility</p:attrName>
+                                        </p:attrNameLst>
+                                      </p:cBhvr>
+                                      <p:to>
+                                        <p:strVal val="visible"/>
+                                      </p:to>
+                                    </p:set>
+                                    <p:animEffect transition="in" filter="fade">
+                                      <p:cBhvr>
+                                        <p:cTn id="7" dur="500"/>
+                                        <p:tgtEl>
+                                          <p:spTgt spid="8"/>
+                                        </p:tgtEl>
+                                      </p:cBhvr>
+                                    </p:animEffect>
+                                  </p:childTnLst>
+                                </p:cTn>
+                              </p:par>
+                            </p:childTnLst>
+                          </p:cTn>
+                        </p:par>
+                      </p:childTnLst>
+                    </p:cTn>
+                  </p:par>
+                  <p:par>
+                    <p:cTn id="8" fill="hold">
+                      <p:stCondLst>
+                        <p:cond delay="indefinite"/>
+                      </p:stCondLst>
+                      <p:childTnLst>
+                        <p:par>
+                          <p:cTn id="9" fill="hold">
+                            <p:stCondLst>
+                              <p:cond delay="0"/>
+                            </p:stCondLst>
+                            <p:childTnLst>
+                              <p:par>
+                                <p:cTn id="10" presetID="10" presetClass="exit" presetSubtype="0" fill="hold" nodeType="clickEffect">
+                                  <p:stCondLst>
+                                    <p:cond delay="0"/>
+                                  </p:stCondLst>
+                                  <p:childTnLst>
+                                    <p:animEffect transition="out" filter="fade">
+                                      <p:cBhvr>
+                                        <p:cTn id="11" dur="500"/>
+                                        <p:tgtEl>
+                                          <p:spTgt spid="8"/>
+                                        </p:tgtEl>
+                                      </p:cBhvr>
+                                    </p:animEffect>
+                                    <p:set>
+                                      <p:cBhvr>
+                                        <p:cTn id="12" dur="1" fill="hold">
+                                          <p:stCondLst>
+                                            <p:cond delay="499"/>
+                                          </p:stCondLst>
+                                        </p:cTn>
+                                        <p:tgtEl>
+                                          <p:spTgt spid="8"/>
+                                        </p:tgtEl>
+                                        <p:attrNameLst>
+                                          <p:attrName>style.visibility</p:attrName>
+                                        </p:attrNameLst>
+                                      </p:cBhvr>
+                                      <p:to>
+                                        <p:strVal val="hidden"/>
+                                      </p:to>
+                                    </p:set>
+                                  </p:childTnLst>
+                                </p:cTn>
+                              </p:par>
+                            </p:childTnLst>
+                          </p:cTn>
+                        </p:par>
+                      </p:childTnLst>
+                    </p:cTn>
+                  </p:par>
+                  <p:par>
+                    <p:cTn id="13" fill="hold">
+                      <p:stCondLst>
+                        <p:cond delay="indefinite"/>
+                      </p:stCondLst>
+                      <p:childTnLst>
+                        <p:par>
+                          <p:cTn id="14" fill="hold">
+                            <p:stCondLst>
+                              <p:cond delay="0"/>
+                            </p:stCondLst>
+                            <p:childTnLst>
+                              <p:par>
+                                <p:cTn id="15" presetID="10" presetClass="entr" presetSubtype="0" fill="hold" nodeType="clickEffect">
+                                  <p:stCondLst>
+                                    <p:cond delay="0"/>
+                                  </p:stCondLst>
+                                  <p:childTnLst>
+                                    <p:set>
+                                      <p:cBhvr>
+                                        <p:cTn id="16" dur="1" fill="hold">
+                                          <p:stCondLst>
+                                            <p:cond delay="0"/>
+                                          </p:stCondLst>
+                                        </p:cTn>
+                                        <p:tgtEl>
+                                          <p:spTgt spid="3"/>
+                                        </p:tgtEl>
+                                        <p:attrNameLst>
+                                          <p:attrName>style.visibility</p:attrName>
+                                        </p:attrNameLst>
+                                      </p:cBhvr>
+                                      <p:to>
+                                        <p:strVal val="visible"/>
+                                      </p:to>
+                                    </p:set>
+                                    <p:animEffect transition="in" filter="fade">
+                                      <p:cBhvr>
+                                        <p:cTn id="17" dur="500"/>
+                                        <p:tgtEl>
+                                          <p:spTgt spid="3"/>
+                                        </p:tgtEl>
+                                      </p:cBhvr>
+                                    </p:animEffect>
+                                  </p:childTnLst>
+                                </p:cTn>
+                              </p:par>
+                            </p:childTnLst>
+                          </p:cTn>
+                        </p:par>
+                      </p:childTnLst>
+                    </p:cTn>
+                  </p:par>
+                </p:childTnLst>
+              </p:cTn>
+              <p:prevCondLst>
+                <p:cond evt="onPrev" delay="0">
+                  <p:tgtEl>
+                    <p:sldTgt/>
+                  </p:tgtEl>
+                </p:cond>
+              </p:prevCondLst>
+              <p:nextCondLst>
+                <p:cond evt="onNext" delay="0">
+                  <p:tgtEl>
+                    <p:sldTgt/>
+                  </p:tgtEl>
+                </p:cond>
+              </p:nextCondLst>
+            </p:seq>
+          </p:childTnLst>
+        </p:cTn>
       </p:par>
     </p:tnLst>
   </p:timing>
@@ -6401,10 +6677,10 @@
           <a:bodyPr/>
           <a:lstStyle/>
           <a:p>
-            <a:r>
+            <a:fld id="{D6BA66C5-E80B-42E8-84E3-874A6734B58F}" type="datetime1">
               <a:rPr lang="de-DE" smtClean="0"/>
               <a:t>20.03.2015</a:t>
-            </a:r>
+            </a:fld>
             <a:endParaRPr lang="de-AT"/>
           </a:p>
         </p:txBody>
@@ -6597,10 +6873,10 @@
           <a:bodyPr/>
           <a:lstStyle/>
           <a:p>
-            <a:r>
+            <a:fld id="{ACE33675-C9A5-4897-B2FB-033D76263C2E}" type="datetime1">
               <a:rPr lang="de-DE" smtClean="0"/>
               <a:t>20.03.2015</a:t>
-            </a:r>
+            </a:fld>
             <a:endParaRPr lang="de-AT"/>
           </a:p>
         </p:txBody>
@@ -6776,10 +7052,10 @@
           <a:bodyPr/>
           <a:lstStyle/>
           <a:p>
-            <a:r>
+            <a:fld id="{88AD3B6B-D159-4283-BF61-3780B2F03993}" type="datetime1">
               <a:rPr lang="de-DE" smtClean="0"/>
               <a:t>20.03.2015</a:t>
-            </a:r>
+            </a:fld>
             <a:endParaRPr lang="de-AT"/>
           </a:p>
         </p:txBody>
@@ -6864,7 +7140,7 @@
         </p:blipFill>
         <p:spPr>
           <a:xfrm>
-            <a:off x="2354580" y="0"/>
+            <a:off x="1776575" y="-124837"/>
             <a:ext cx="6834025" cy="6261537"/>
           </a:xfrm>
         </p:spPr>
@@ -6877,8 +7153,8 @@
         </p:nvSpPr>
         <p:spPr>
           <a:xfrm>
-            <a:off x="5371171" y="6261537"/>
-            <a:ext cx="1449658" cy="584775"/>
+            <a:off x="4464011" y="6246524"/>
+            <a:ext cx="954292" cy="584775"/>
           </a:xfrm>
           <a:prstGeom prst="rect">
             <a:avLst/>
@@ -6960,11 +7236,11 @@
           <a:bodyPr/>
           <a:lstStyle/>
           <a:p>
-            <a:r>
+            <a:fld id="{7EB25007-6832-4587-A9C4-E4862A387D60}" type="datetime1">
               <a:rPr lang="de-DE" smtClean="0"/>
               <a:t>20.03.2015</a:t>
-            </a:r>
-            <a:endParaRPr lang="de-AT"/>
+            </a:fld>
+            <a:endParaRPr lang="de-AT" dirty="0"/>
           </a:p>
         </p:txBody>
       </p:sp>
@@ -7127,10 +7403,10 @@
           <a:bodyPr/>
           <a:lstStyle/>
           <a:p>
-            <a:r>
+            <a:fld id="{34E1EEDE-CA39-4E9E-A966-E5731202788D}" type="datetime1">
               <a:rPr lang="de-DE" smtClean="0"/>
               <a:t>20.03.2015</a:t>
-            </a:r>
+            </a:fld>
             <a:endParaRPr lang="de-AT"/>
           </a:p>
         </p:txBody>
@@ -7415,10 +7691,10 @@
           <a:bodyPr/>
           <a:lstStyle/>
           <a:p>
-            <a:r>
+            <a:fld id="{43A371B9-9827-44CF-A2CB-DBB425EE9243}" type="datetime1">
               <a:rPr lang="de-DE" smtClean="0"/>
               <a:t>20.03.2015</a:t>
-            </a:r>
+            </a:fld>
             <a:endParaRPr lang="de-AT"/>
           </a:p>
         </p:txBody>
@@ -7686,10 +7962,10 @@
           <a:bodyPr/>
           <a:lstStyle/>
           <a:p>
-            <a:r>
+            <a:fld id="{B2659454-A7AF-46C9-AA41-E391B5E40289}" type="datetime1">
               <a:rPr lang="de-DE" smtClean="0"/>
               <a:t>20.03.2015</a:t>
-            </a:r>
+            </a:fld>
             <a:endParaRPr lang="de-AT"/>
           </a:p>
         </p:txBody>
@@ -7887,10 +8163,10 @@
           <a:bodyPr/>
           <a:lstStyle/>
           <a:p>
-            <a:r>
+            <a:fld id="{C1C51985-1281-45AF-963F-05EC6D2EE6D6}" type="datetime1">
               <a:rPr lang="de-DE" smtClean="0"/>
               <a:t>20.03.2015</a:t>
-            </a:r>
+            </a:fld>
             <a:endParaRPr lang="de-AT"/>
           </a:p>
         </p:txBody>
@@ -8150,10 +8426,10 @@
           <a:bodyPr/>
           <a:lstStyle/>
           <a:p>
-            <a:r>
+            <a:fld id="{01062D84-B6F1-4810-9B7F-8063C42E076D}" type="datetime1">
               <a:rPr lang="de-DE" smtClean="0"/>
               <a:t>20.03.2015</a:t>
-            </a:r>
+            </a:fld>
             <a:endParaRPr lang="de-AT"/>
           </a:p>
         </p:txBody>
@@ -8370,10 +8646,10 @@
           <a:bodyPr/>
           <a:lstStyle/>
           <a:p>
-            <a:r>
+            <a:fld id="{E33BB310-DEC1-4619-804A-73C44F354A87}" type="datetime1">
               <a:rPr lang="de-DE" smtClean="0"/>
               <a:t>20.03.2015</a:t>
-            </a:r>
+            </a:fld>
             <a:endParaRPr lang="de-AT"/>
           </a:p>
         </p:txBody>
@@ -8493,7 +8769,7 @@
       </p:sp>
       <p:sp>
         <p:nvSpPr>
-          <p:cNvPr id="5" name="Fußzeilenplatzhalter 4"/>
+          <p:cNvPr id="8" name="Fußzeilenplatzhalter 7"/>
           <p:cNvSpPr>
             <a:spLocks noGrp="1"/>
           </p:cNvSpPr>
@@ -8516,7 +8792,7 @@
       </p:sp>
       <p:sp>
         <p:nvSpPr>
-          <p:cNvPr id="6" name="Datumsplatzhalter 5"/>
+          <p:cNvPr id="9" name="Datumsplatzhalter 8"/>
           <p:cNvSpPr>
             <a:spLocks noGrp="1"/>
           </p:cNvSpPr>
@@ -8529,10 +8805,10 @@
           <a:bodyPr/>
           <a:lstStyle/>
           <a:p>
-            <a:r>
+            <a:fld id="{D6BA66C5-E80B-42E8-84E3-874A6734B58F}" type="datetime1">
               <a:rPr lang="de-DE" smtClean="0"/>
               <a:t>20.03.2015</a:t>
-            </a:r>
+            </a:fld>
             <a:endParaRPr lang="de-AT"/>
           </a:p>
         </p:txBody>
@@ -8540,7 +8816,7 @@
     </p:spTree>
     <p:extLst>
       <p:ext uri="{BB962C8B-B14F-4D97-AF65-F5344CB8AC3E}">
-        <p14:creationId xmlns:p14="http://schemas.microsoft.com/office/powerpoint/2010/main" val="3678899283"/>
+        <p14:creationId xmlns:p14="http://schemas.microsoft.com/office/powerpoint/2010/main" val="2534362909"/>
       </p:ext>
     </p:extLst>
   </p:cSld>
@@ -8699,10 +8975,10 @@
           <a:bodyPr/>
           <a:lstStyle/>
           <a:p>
-            <a:r>
+            <a:fld id="{F7FDF624-5214-453A-A54E-7ED130C1C382}" type="datetime1">
               <a:rPr lang="de-DE" smtClean="0"/>
               <a:t>20.03.2015</a:t>
-            </a:r>
+            </a:fld>
             <a:endParaRPr lang="de-AT"/>
           </a:p>
         </p:txBody>
@@ -8869,10 +9145,10 @@
           <a:bodyPr/>
           <a:lstStyle/>
           <a:p>
-            <a:r>
+            <a:fld id="{85E9049F-2940-4788-AE75-1D798FAA5066}" type="datetime1">
               <a:rPr lang="de-DE" smtClean="0"/>
               <a:t>20.03.2015</a:t>
-            </a:r>
+            </a:fld>
             <a:endParaRPr lang="de-AT"/>
           </a:p>
         </p:txBody>
@@ -9085,10 +9361,10 @@
           <a:bodyPr/>
           <a:lstStyle/>
           <a:p>
-            <a:r>
+            <a:fld id="{361EFA62-FFCA-464E-80D3-F0662AB43B3B}" type="datetime1">
               <a:rPr lang="de-DE" smtClean="0"/>
               <a:t>20.03.2015</a:t>
-            </a:r>
+            </a:fld>
             <a:endParaRPr lang="de-AT"/>
           </a:p>
         </p:txBody>
@@ -9249,15 +9525,7 @@
           <a:p>
             <a:r>
               <a:rPr lang="en-US" dirty="0" smtClean="0"/>
-              <a:t> Rest is </a:t>
-            </a:r>
-            <a:r>
-              <a:rPr lang="en-US" dirty="0" smtClean="0"/>
-              <a:t>basically </a:t>
-            </a:r>
-            <a:r>
-              <a:rPr lang="en-US" dirty="0" smtClean="0"/>
-              <a:t>using HTTP Requests </a:t>
+              <a:t> Rest is basically using HTTP Requests </a:t>
             </a:r>
             <a:endParaRPr lang="de-AT" dirty="0"/>
           </a:p>
@@ -9324,10 +9592,10 @@
           <a:bodyPr/>
           <a:lstStyle/>
           <a:p>
-            <a:r>
+            <a:fld id="{ED9B8C42-8A7A-40AE-A096-7A3BA152C118}" type="datetime1">
               <a:rPr lang="de-DE" smtClean="0"/>
               <a:t>20.03.2015</a:t>
-            </a:r>
+            </a:fld>
             <a:endParaRPr lang="de-AT"/>
           </a:p>
         </p:txBody>
@@ -9553,10 +9821,10 @@
           <a:bodyPr/>
           <a:lstStyle/>
           <a:p>
-            <a:r>
-              <a:rPr lang="de-DE" dirty="0" smtClean="0"/>
+            <a:fld id="{B0A18857-E257-4BAE-8ABE-20BB9FF6348A}" type="datetime1">
+              <a:rPr lang="de-DE" smtClean="0"/>
               <a:t>20.03.2015</a:t>
-            </a:r>
+            </a:fld>
             <a:endParaRPr lang="de-AT" dirty="0"/>
           </a:p>
         </p:txBody>
@@ -9851,10 +10119,10 @@
           <a:bodyPr/>
           <a:lstStyle/>
           <a:p>
-            <a:r>
+            <a:fld id="{59536F56-A2C7-4B90-BF4F-539739D37D3F}" type="datetime1">
               <a:rPr lang="de-DE" smtClean="0"/>
               <a:t>20.03.2015</a:t>
-            </a:r>
+            </a:fld>
             <a:endParaRPr lang="de-AT"/>
           </a:p>
         </p:txBody>
@@ -10135,10 +10403,10 @@
           <a:bodyPr/>
           <a:lstStyle/>
           <a:p>
-            <a:r>
+            <a:fld id="{340D86FC-D38B-4409-B200-A9DFC91C1D37}" type="datetime1">
               <a:rPr lang="de-DE" smtClean="0"/>
               <a:t>20.03.2015</a:t>
-            </a:r>
+            </a:fld>
             <a:endParaRPr lang="de-AT"/>
           </a:p>
         </p:txBody>
@@ -10282,10 +10550,10 @@
           <a:bodyPr/>
           <a:lstStyle/>
           <a:p>
-            <a:r>
+            <a:fld id="{8753545B-CD37-44F3-AA7B-DA6D202C67EC}" type="datetime1">
               <a:rPr lang="de-DE" smtClean="0"/>
               <a:t>20.03.2015</a:t>
-            </a:r>
+            </a:fld>
             <a:endParaRPr lang="de-AT"/>
           </a:p>
         </p:txBody>
@@ -10524,10 +10792,10 @@
           <a:bodyPr/>
           <a:lstStyle/>
           <a:p>
-            <a:r>
+            <a:fld id="{F11BB41C-F984-450A-BD8B-3D36328E90A0}" type="datetime1">
               <a:rPr lang="de-DE" smtClean="0"/>
               <a:t>20.03.2015</a:t>
-            </a:r>
+            </a:fld>
             <a:endParaRPr lang="de-AT"/>
           </a:p>
         </p:txBody>
@@ -10949,10 +11217,10 @@
           <a:bodyPr/>
           <a:lstStyle/>
           <a:p>
-            <a:r>
+            <a:fld id="{5306ED8B-63D2-4EA8-B960-FAAA9092969D}" type="datetime1">
               <a:rPr lang="de-DE" smtClean="0"/>
               <a:t>20.03.2015</a:t>
-            </a:r>
+            </a:fld>
             <a:endParaRPr lang="de-AT"/>
           </a:p>
         </p:txBody>
@@ -11153,10 +11421,10 @@
           <a:bodyPr/>
           <a:lstStyle/>
           <a:p>
-            <a:r>
+            <a:fld id="{27921C9D-E670-411C-85BF-B87B25B0B305}" type="datetime1">
               <a:rPr lang="de-DE" smtClean="0"/>
               <a:t>20.03.2015</a:t>
-            </a:r>
+            </a:fld>
             <a:endParaRPr lang="de-AT"/>
           </a:p>
         </p:txBody>
@@ -11393,10 +11661,10 @@
           <a:bodyPr/>
           <a:lstStyle/>
           <a:p>
-            <a:r>
+            <a:fld id="{B89308BA-6136-4133-9C1A-59FBA1CF2189}" type="datetime1">
               <a:rPr lang="de-DE" smtClean="0"/>
               <a:t>20.03.2015</a:t>
-            </a:r>
+            </a:fld>
             <a:endParaRPr lang="de-AT"/>
           </a:p>
         </p:txBody>
@@ -11476,10 +11744,9 @@
           <a:bodyPr/>
           <a:lstStyle/>
           <a:p>
-            <a:r>
-              <a:rPr lang="de-AT" dirty="0" smtClean="0"/>
-              <a:t>[</a:t>
-            </a:r>
+            <a:pPr marL="0" indent="0">
+              <a:buNone/>
+            </a:pPr>
             <a:endParaRPr lang="de-AT" dirty="0"/>
           </a:p>
         </p:txBody>
@@ -11586,10 +11853,10 @@
           <a:bodyPr/>
           <a:lstStyle/>
           <a:p>
-            <a:r>
+            <a:fld id="{5B8E7CA3-CE95-4D4E-A863-84E9CCB2FEB9}" type="datetime1">
               <a:rPr lang="de-DE" smtClean="0"/>
               <a:t>20.03.2015</a:t>
-            </a:r>
+            </a:fld>
             <a:endParaRPr lang="de-AT"/>
           </a:p>
         </p:txBody>
@@ -11926,10 +12193,10 @@
           <a:bodyPr/>
           <a:lstStyle/>
           <a:p>
-            <a:r>
+            <a:fld id="{741BD53E-D256-44B5-A6A4-0B6792B90209}" type="datetime1">
               <a:rPr lang="de-DE" smtClean="0"/>
               <a:t>20.03.2015</a:t>
-            </a:r>
+            </a:fld>
             <a:endParaRPr lang="de-AT"/>
           </a:p>
         </p:txBody>
@@ -12410,10 +12677,10 @@
           <a:bodyPr/>
           <a:lstStyle/>
           <a:p>
-            <a:r>
+            <a:fld id="{F3B31E98-2116-4E50-BA66-70CA41D54814}" type="datetime1">
               <a:rPr lang="de-DE" smtClean="0"/>
               <a:t>20.03.2015</a:t>
-            </a:r>
+            </a:fld>
             <a:endParaRPr lang="de-AT"/>
           </a:p>
         </p:txBody>
@@ -12569,9 +12836,39 @@
           <a:chExt cx="0" cy="0"/>
         </a:xfrm>
       </p:grpSpPr>
-      <p:sp>
-        <p:nvSpPr>
-          <p:cNvPr id="2" name="Title 1"/>
+      <p:pic>
+        <p:nvPicPr>
+          <p:cNvPr id="11" name="Picture 10"/>
+          <p:cNvPicPr>
+            <a:picLocks noChangeAspect="1"/>
+          </p:cNvPicPr>
+          <p:nvPr/>
+        </p:nvPicPr>
+        <p:blipFill>
+          <a:blip r:embed="rId2">
+            <a:extLst>
+              <a:ext uri="{28A0092B-C50C-407E-A947-70E740481C1C}">
+                <a14:useLocalDpi xmlns:a14="http://schemas.microsoft.com/office/drawing/2010/main" val="0"/>
+              </a:ext>
+            </a:extLst>
+          </a:blip>
+          <a:stretch>
+            <a:fillRect/>
+          </a:stretch>
+        </p:blipFill>
+        <p:spPr>
+          <a:xfrm>
+            <a:off x="5343159" y="-1"/>
+            <a:ext cx="6010641" cy="4365939"/>
+          </a:xfrm>
+          <a:prstGeom prst="rect">
+            <a:avLst/>
+          </a:prstGeom>
+        </p:spPr>
+      </p:pic>
+      <p:sp>
+        <p:nvSpPr>
+          <p:cNvPr id="5" name="Title 4"/>
           <p:cNvSpPr>
             <a:spLocks noGrp="1"/>
           </p:cNvSpPr>
@@ -12586,7 +12883,7 @@
           <a:p>
             <a:r>
               <a:rPr lang="de-AT" dirty="0" smtClean="0"/>
-              <a:t>Problems?</a:t>
+              <a:t>Service</a:t>
             </a:r>
             <a:endParaRPr lang="de-AT" dirty="0"/>
           </a:p>
@@ -12594,7 +12891,7 @@
       </p:sp>
       <p:sp>
         <p:nvSpPr>
-          <p:cNvPr id="3" name="Content Placeholder 2"/>
+          <p:cNvPr id="10" name="Content Placeholder 9"/>
           <p:cNvSpPr>
             <a:spLocks noGrp="1"/>
           </p:cNvSpPr>
@@ -12609,34 +12906,34 @@
           <a:p>
             <a:r>
               <a:rPr lang="de-AT" dirty="0" smtClean="0"/>
-              <a:t>Resistant to change</a:t>
-            </a:r>
-          </a:p>
-          <a:p>
-            <a:endParaRPr lang="de-AT" sz="800" dirty="0" smtClean="0"/>
+              <a:t>Unit of logic</a:t>
+            </a:r>
+          </a:p>
+          <a:p>
+            <a:endParaRPr lang="de-AT" dirty="0"/>
           </a:p>
           <a:p>
             <a:r>
               <a:rPr lang="de-AT" dirty="0" smtClean="0"/>
-              <a:t>Communication and data transmission</a:t>
-            </a:r>
-          </a:p>
-          <a:p>
-            <a:endParaRPr lang="de-AT" sz="800" dirty="0" smtClean="0"/>
+              <a:t>SOA Design Principles Applied</a:t>
+            </a:r>
+          </a:p>
+          <a:p>
+            <a:endParaRPr lang="de-AT" dirty="0"/>
           </a:p>
           <a:p>
             <a:r>
               <a:rPr lang="de-AT" dirty="0" smtClean="0"/>
-              <a:t>Vendor dependency</a:t>
-            </a:r>
-          </a:p>
-          <a:p>
-            <a:endParaRPr lang="de-AT" sz="800" dirty="0" smtClean="0"/>
+              <a:t>Clearly defined function</a:t>
+            </a:r>
+          </a:p>
+          <a:p>
+            <a:endParaRPr lang="de-AT" dirty="0"/>
           </a:p>
           <a:p>
             <a:r>
               <a:rPr lang="de-AT" dirty="0" smtClean="0"/>
-              <a:t>Not enough support to BPM</a:t>
+              <a:t>Description of the functionality</a:t>
             </a:r>
             <a:endParaRPr lang="de-AT" dirty="0"/>
           </a:p>
@@ -12644,7 +12941,7 @@
       </p:sp>
       <p:sp>
         <p:nvSpPr>
-          <p:cNvPr id="4" name="Foliennummernplatzhalter 3"/>
+          <p:cNvPr id="2" name="Foliennummernplatzhalter 1"/>
           <p:cNvSpPr>
             <a:spLocks noGrp="1"/>
           </p:cNvSpPr>
@@ -12667,7 +12964,7 @@
       </p:sp>
       <p:sp>
         <p:nvSpPr>
-          <p:cNvPr id="8" name="Fußzeilenplatzhalter 7"/>
+          <p:cNvPr id="3" name="Fußzeilenplatzhalter 2"/>
           <p:cNvSpPr>
             <a:spLocks noGrp="1"/>
           </p:cNvSpPr>
@@ -12690,7 +12987,7 @@
       </p:sp>
       <p:sp>
         <p:nvSpPr>
-          <p:cNvPr id="9" name="Datumsplatzhalter 8"/>
+          <p:cNvPr id="4" name="Datumsplatzhalter 3"/>
           <p:cNvSpPr>
             <a:spLocks noGrp="1"/>
           </p:cNvSpPr>
@@ -12703,10 +13000,10 @@
           <a:bodyPr/>
           <a:lstStyle/>
           <a:p>
-            <a:r>
+            <a:fld id="{5C92D8B0-B5F4-4B71-8301-3D703AF265B3}" type="datetime1">
               <a:rPr lang="de-DE" smtClean="0"/>
               <a:t>20.03.2015</a:t>
-            </a:r>
+            </a:fld>
             <a:endParaRPr lang="de-AT"/>
           </a:p>
         </p:txBody>
@@ -12714,7 +13011,7 @@
     </p:spTree>
     <p:extLst>
       <p:ext uri="{BB962C8B-B14F-4D97-AF65-F5344CB8AC3E}">
-        <p14:creationId xmlns:p14="http://schemas.microsoft.com/office/powerpoint/2010/main" val="2558781691"/>
+        <p14:creationId xmlns:p14="http://schemas.microsoft.com/office/powerpoint/2010/main" val="137191320"/>
       </p:ext>
     </p:extLst>
   </p:cSld>
@@ -12761,15 +13058,25 @@
             <p:ph type="title"/>
           </p:nvPr>
         </p:nvSpPr>
-        <p:spPr/>
-        <p:txBody>
-          <a:bodyPr/>
-          <a:lstStyle/>
-          <a:p>
-            <a:r>
-              <a:rPr lang="de-AT" dirty="0"/>
+        <p:spPr>
+          <a:xfrm>
+            <a:off x="2895600" y="2675731"/>
+            <a:ext cx="10515600" cy="1325563"/>
+          </a:xfrm>
+        </p:spPr>
+        <p:txBody>
+          <a:bodyPr/>
+          <a:lstStyle/>
+          <a:p>
+            <a:r>
+              <a:rPr lang="de-AT" dirty="0" smtClean="0"/>
+              <a:t>Summary &amp; </a:t>
+            </a:r>
+            <a:r>
+              <a:rPr lang="de-AT" dirty="0" err="1" smtClean="0"/>
               <a:t>Conclusion</a:t>
             </a:r>
+            <a:endParaRPr lang="de-AT" dirty="0"/>
           </a:p>
         </p:txBody>
       </p:sp>
@@ -12790,28 +13097,6 @@
           </a:bodyPr>
           <a:lstStyle/>
           <a:p>
-            <a:r>
-              <a:rPr lang="de-AT" dirty="0" smtClean="0"/>
-              <a:t>Powerful</a:t>
-            </a:r>
-          </a:p>
-          <a:p>
-            <a:endParaRPr lang="de-AT" sz="800" dirty="0" smtClean="0"/>
-          </a:p>
-          <a:p>
-            <a:r>
-              <a:rPr lang="de-AT" dirty="0" smtClean="0"/>
-              <a:t>Return of Investment</a:t>
-            </a:r>
-          </a:p>
-          <a:p>
-            <a:endParaRPr lang="de-AT" sz="800" dirty="0" smtClean="0"/>
-          </a:p>
-          <a:p>
-            <a:r>
-              <a:rPr lang="de-AT" dirty="0" smtClean="0"/>
-              <a:t>System might be hard to debug / manage </a:t>
-            </a:r>
             <a:endParaRPr lang="de-AT" dirty="0"/>
           </a:p>
         </p:txBody>
@@ -12877,10 +13162,10 @@
           <a:bodyPr/>
           <a:lstStyle/>
           <a:p>
-            <a:r>
+            <a:fld id="{5EB6BC8D-5C6D-4DF4-8F7B-C274E51B76EB}" type="datetime1">
               <a:rPr lang="de-DE" smtClean="0"/>
               <a:t>20.03.2015</a:t>
-            </a:r>
+            </a:fld>
             <a:endParaRPr lang="de-AT"/>
           </a:p>
         </p:txBody>
@@ -13031,11 +13316,11 @@
           <a:bodyPr/>
           <a:lstStyle/>
           <a:p>
-            <a:r>
+            <a:fld id="{0A375518-3447-4709-BC1A-8F72796883D9}" type="datetime1">
               <a:rPr lang="de-DE" smtClean="0"/>
               <a:t>20.03.2015</a:t>
-            </a:r>
-            <a:endParaRPr lang="de-AT"/>
+            </a:fld>
+            <a:endParaRPr lang="de-AT" dirty="0"/>
           </a:p>
         </p:txBody>
       </p:sp>
@@ -13345,10 +13630,10 @@
           <a:bodyPr/>
           <a:lstStyle/>
           <a:p>
-            <a:r>
+            <a:fld id="{A4C699B2-DDFA-4EF1-ADC9-ADE774320246}" type="datetime1">
               <a:rPr lang="de-DE" smtClean="0"/>
               <a:t>20.03.2015</a:t>
-            </a:r>
+            </a:fld>
             <a:endParaRPr lang="de-AT"/>
           </a:p>
         </p:txBody>
@@ -13407,6 +13692,188 @@
           <a:p>
             <a:r>
               <a:rPr lang="de-AT" dirty="0" smtClean="0"/>
+              <a:t>Problems?</a:t>
+            </a:r>
+            <a:endParaRPr lang="de-AT" dirty="0"/>
+          </a:p>
+        </p:txBody>
+      </p:sp>
+      <p:sp>
+        <p:nvSpPr>
+          <p:cNvPr id="3" name="Content Placeholder 2"/>
+          <p:cNvSpPr>
+            <a:spLocks noGrp="1"/>
+          </p:cNvSpPr>
+          <p:nvPr>
+            <p:ph idx="1"/>
+          </p:nvPr>
+        </p:nvSpPr>
+        <p:spPr/>
+        <p:txBody>
+          <a:bodyPr/>
+          <a:lstStyle/>
+          <a:p>
+            <a:r>
+              <a:rPr lang="de-AT" dirty="0" smtClean="0"/>
+              <a:t>Resistant to change</a:t>
+            </a:r>
+          </a:p>
+          <a:p>
+            <a:endParaRPr lang="de-AT" sz="800" dirty="0" smtClean="0"/>
+          </a:p>
+          <a:p>
+            <a:r>
+              <a:rPr lang="de-AT" dirty="0" smtClean="0"/>
+              <a:t>Communication and data transmission</a:t>
+            </a:r>
+          </a:p>
+          <a:p>
+            <a:endParaRPr lang="de-AT" sz="800" dirty="0" smtClean="0"/>
+          </a:p>
+          <a:p>
+            <a:r>
+              <a:rPr lang="de-AT" dirty="0" smtClean="0"/>
+              <a:t>Vendor dependency</a:t>
+            </a:r>
+          </a:p>
+          <a:p>
+            <a:endParaRPr lang="de-AT" sz="800" dirty="0" smtClean="0"/>
+          </a:p>
+          <a:p>
+            <a:r>
+              <a:rPr lang="de-AT" dirty="0" smtClean="0"/>
+              <a:t>Not enough support to BPM</a:t>
+            </a:r>
+            <a:endParaRPr lang="de-AT" dirty="0"/>
+          </a:p>
+        </p:txBody>
+      </p:sp>
+      <p:sp>
+        <p:nvSpPr>
+          <p:cNvPr id="4" name="Foliennummernplatzhalter 3"/>
+          <p:cNvSpPr>
+            <a:spLocks noGrp="1"/>
+          </p:cNvSpPr>
+          <p:nvPr>
+            <p:ph type="sldNum" sz="quarter" idx="12"/>
+          </p:nvPr>
+        </p:nvSpPr>
+        <p:spPr/>
+        <p:txBody>
+          <a:bodyPr/>
+          <a:lstStyle/>
+          <a:p>
+            <a:fld id="{0582A2BA-FDDD-4C1C-9C58-E41C263E2DD2}" type="slidenum">
+              <a:rPr lang="de-AT" smtClean="0"/>
+              <a:t>5</a:t>
+            </a:fld>
+            <a:endParaRPr lang="de-AT"/>
+          </a:p>
+        </p:txBody>
+      </p:sp>
+      <p:sp>
+        <p:nvSpPr>
+          <p:cNvPr id="8" name="Fußzeilenplatzhalter 7"/>
+          <p:cNvSpPr>
+            <a:spLocks noGrp="1"/>
+          </p:cNvSpPr>
+          <p:nvPr>
+            <p:ph type="ftr" sz="quarter" idx="11"/>
+          </p:nvPr>
+        </p:nvSpPr>
+        <p:spPr/>
+        <p:txBody>
+          <a:bodyPr/>
+          <a:lstStyle/>
+          <a:p>
+            <a:r>
+              <a:rPr lang="de-AT" smtClean="0"/>
+              <a:t>SOA, REST &amp; JSON</a:t>
+            </a:r>
+            <a:endParaRPr lang="de-AT"/>
+          </a:p>
+        </p:txBody>
+      </p:sp>
+      <p:sp>
+        <p:nvSpPr>
+          <p:cNvPr id="9" name="Datumsplatzhalter 8"/>
+          <p:cNvSpPr>
+            <a:spLocks noGrp="1"/>
+          </p:cNvSpPr>
+          <p:nvPr>
+            <p:ph type="dt" sz="half" idx="10"/>
+          </p:nvPr>
+        </p:nvSpPr>
+        <p:spPr/>
+        <p:txBody>
+          <a:bodyPr/>
+          <a:lstStyle/>
+          <a:p>
+            <a:fld id="{718145B4-6776-496C-9E84-296BE9506C6E}" type="datetime1">
+              <a:rPr lang="de-DE" smtClean="0"/>
+              <a:t>20.03.2015</a:t>
+            </a:fld>
+            <a:endParaRPr lang="de-AT"/>
+          </a:p>
+        </p:txBody>
+      </p:sp>
+    </p:spTree>
+    <p:extLst>
+      <p:ext uri="{BB962C8B-B14F-4D97-AF65-F5344CB8AC3E}">
+        <p14:creationId xmlns:p14="http://schemas.microsoft.com/office/powerpoint/2010/main" val="2558781691"/>
+      </p:ext>
+    </p:extLst>
+  </p:cSld>
+  <p:clrMapOvr>
+    <a:masterClrMapping/>
+  </p:clrMapOvr>
+  <p:transition spd="slow">
+    <p:push dir="u"/>
+  </p:transition>
+  <p:timing>
+    <p:tnLst>
+      <p:par>
+        <p:cTn id="1" dur="indefinite" restart="never" nodeType="tmRoot"/>
+      </p:par>
+    </p:tnLst>
+  </p:timing>
+</p:sld>
+</file>
+
+<file path=ppt/slides/slide6.xml><?xml version="1.0" encoding="utf-8"?>
+<p:sld xmlns:a="http://schemas.openxmlformats.org/drawingml/2006/main" xmlns:r="http://schemas.openxmlformats.org/officeDocument/2006/relationships" xmlns:p="http://schemas.openxmlformats.org/presentationml/2006/main" show="0">
+  <p:cSld>
+    <p:spTree>
+      <p:nvGrpSpPr>
+        <p:cNvPr id="1" name=""/>
+        <p:cNvGrpSpPr/>
+        <p:nvPr/>
+      </p:nvGrpSpPr>
+      <p:grpSpPr>
+        <a:xfrm>
+          <a:off x="0" y="0"/>
+          <a:ext cx="0" cy="0"/>
+          <a:chOff x="0" y="0"/>
+          <a:chExt cx="0" cy="0"/>
+        </a:xfrm>
+      </p:grpSpPr>
+      <p:sp>
+        <p:nvSpPr>
+          <p:cNvPr id="2" name="Title 1"/>
+          <p:cNvSpPr>
+            <a:spLocks noGrp="1"/>
+          </p:cNvSpPr>
+          <p:nvPr>
+            <p:ph type="title"/>
+          </p:nvPr>
+        </p:nvSpPr>
+        <p:spPr/>
+        <p:txBody>
+          <a:bodyPr/>
+          <a:lstStyle/>
+          <a:p>
+            <a:r>
+              <a:rPr lang="de-AT" dirty="0" smtClean="0"/>
               <a:t>Solution</a:t>
             </a:r>
             <a:endParaRPr lang="de-AT" dirty="0"/>
@@ -13460,7 +13927,7 @@
           <a:p>
             <a:fld id="{0582A2BA-FDDD-4C1C-9C58-E41C263E2DD2}" type="slidenum">
               <a:rPr lang="de-AT" smtClean="0"/>
-              <a:t>5</a:t>
+              <a:t>6</a:t>
             </a:fld>
             <a:endParaRPr lang="de-AT"/>
           </a:p>
@@ -13504,10 +13971,10 @@
           <a:bodyPr/>
           <a:lstStyle/>
           <a:p>
-            <a:r>
+            <a:fld id="{11EFD1E8-8F78-4E66-9934-F7BECC788165}" type="datetime1">
               <a:rPr lang="de-DE" smtClean="0"/>
               <a:t>20.03.2015</a:t>
-            </a:r>
+            </a:fld>
             <a:endParaRPr lang="de-AT"/>
           </a:p>
         </p:txBody>
@@ -13603,7 +14070,7 @@
 </p:sld>
 </file>
 
-<file path=ppt/slides/slide6.xml><?xml version="1.0" encoding="utf-8"?>
+<file path=ppt/slides/slide7.xml><?xml version="1.0" encoding="utf-8"?>
 <p:sld xmlns:a="http://schemas.openxmlformats.org/drawingml/2006/main" xmlns:r="http://schemas.openxmlformats.org/officeDocument/2006/relationships" xmlns:p="http://schemas.openxmlformats.org/presentationml/2006/main">
   <p:cSld>
     <p:spTree>
@@ -13730,7 +14197,7 @@
           <a:p>
             <a:fld id="{0582A2BA-FDDD-4C1C-9C58-E41C263E2DD2}" type="slidenum">
               <a:rPr lang="de-AT" smtClean="0"/>
-              <a:t>6</a:t>
+              <a:t>7</a:t>
             </a:fld>
             <a:endParaRPr lang="de-AT"/>
           </a:p>
@@ -13774,10 +14241,10 @@
           <a:bodyPr/>
           <a:lstStyle/>
           <a:p>
-            <a:r>
+            <a:fld id="{DEF3A663-69C5-4578-AAD9-EFD821ABF3ED}" type="datetime1">
               <a:rPr lang="de-DE" smtClean="0"/>
               <a:t>20.03.2015</a:t>
-            </a:r>
+            </a:fld>
             <a:endParaRPr lang="de-AT"/>
           </a:p>
         </p:txBody>
@@ -13805,442 +14272,6 @@
 </p:sld>
 </file>
 
-<file path=ppt/slides/slide7.xml><?xml version="1.0" encoding="utf-8"?>
-<p:sld xmlns:a="http://schemas.openxmlformats.org/drawingml/2006/main" xmlns:r="http://schemas.openxmlformats.org/officeDocument/2006/relationships" xmlns:p="http://schemas.openxmlformats.org/presentationml/2006/main">
-  <p:cSld>
-    <p:spTree>
-      <p:nvGrpSpPr>
-        <p:cNvPr id="1" name=""/>
-        <p:cNvGrpSpPr/>
-        <p:nvPr/>
-      </p:nvGrpSpPr>
-      <p:grpSpPr>
-        <a:xfrm>
-          <a:off x="0" y="0"/>
-          <a:ext cx="0" cy="0"/>
-          <a:chOff x="0" y="0"/>
-          <a:chExt cx="0" cy="0"/>
-        </a:xfrm>
-      </p:grpSpPr>
-      <p:sp>
-        <p:nvSpPr>
-          <p:cNvPr id="4" name="Content Placeholder 3"/>
-          <p:cNvSpPr>
-            <a:spLocks noGrp="1"/>
-          </p:cNvSpPr>
-          <p:nvPr>
-            <p:ph idx="1"/>
-          </p:nvPr>
-        </p:nvSpPr>
-        <p:spPr/>
-        <p:txBody>
-          <a:bodyPr/>
-          <a:lstStyle/>
-          <a:p>
-            <a:r>
-              <a:rPr lang="de-AT" dirty="0" smtClean="0"/>
-              <a:t>Normal Lifcycle + Service Lifecycle</a:t>
-            </a:r>
-          </a:p>
-          <a:p>
-            <a:endParaRPr lang="de-AT" sz="800" dirty="0" smtClean="0"/>
-          </a:p>
-          <a:p>
-            <a:r>
-              <a:rPr lang="de-AT" dirty="0" smtClean="0"/>
-              <a:t>Differences from normal software development:</a:t>
-            </a:r>
-          </a:p>
-          <a:p>
-            <a:pPr lvl="1"/>
-            <a:r>
-              <a:rPr lang="de-AT" dirty="0" smtClean="0"/>
-              <a:t>Identifying the Business Process</a:t>
-            </a:r>
-          </a:p>
-          <a:p>
-            <a:pPr lvl="1"/>
-            <a:r>
-              <a:rPr lang="de-AT" dirty="0" smtClean="0"/>
-              <a:t>Build and compose </a:t>
-            </a:r>
-          </a:p>
-          <a:p>
-            <a:pPr lvl="1"/>
-            <a:r>
-              <a:rPr lang="de-AT" dirty="0" smtClean="0"/>
-              <a:t>Change</a:t>
-            </a:r>
-          </a:p>
-          <a:p>
-            <a:pPr lvl="1"/>
-            <a:r>
-              <a:rPr lang="de-AT" dirty="0" smtClean="0"/>
-              <a:t>Retirement</a:t>
-            </a:r>
-            <a:endParaRPr lang="de-AT" dirty="0"/>
-          </a:p>
-          <a:p>
-            <a:endParaRPr lang="de-AT" dirty="0"/>
-          </a:p>
-        </p:txBody>
-      </p:sp>
-      <p:pic>
-        <p:nvPicPr>
-          <p:cNvPr id="8" name="Picture 7"/>
-          <p:cNvPicPr>
-            <a:picLocks noChangeAspect="1"/>
-          </p:cNvPicPr>
-          <p:nvPr/>
-        </p:nvPicPr>
-        <p:blipFill rotWithShape="1">
-          <a:blip r:embed="rId2">
-            <a:extLst>
-              <a:ext uri="{28A0092B-C50C-407E-A947-70E740481C1C}">
-                <a14:useLocalDpi xmlns:a14="http://schemas.microsoft.com/office/drawing/2010/main" val="0"/>
-              </a:ext>
-            </a:extLst>
-          </a:blip>
-          <a:srcRect b="37085"/>
-          <a:stretch/>
-        </p:blipFill>
-        <p:spPr>
-          <a:xfrm>
-            <a:off x="227347" y="1162654"/>
-            <a:ext cx="9110909" cy="5184373"/>
-          </a:xfrm>
-          <a:prstGeom prst="rect">
-            <a:avLst/>
-          </a:prstGeom>
-        </p:spPr>
-      </p:pic>
-      <p:sp>
-        <p:nvSpPr>
-          <p:cNvPr id="2" name="Title 1"/>
-          <p:cNvSpPr>
-            <a:spLocks noGrp="1"/>
-          </p:cNvSpPr>
-          <p:nvPr>
-            <p:ph type="title"/>
-          </p:nvPr>
-        </p:nvSpPr>
-        <p:spPr/>
-        <p:txBody>
-          <a:bodyPr/>
-          <a:lstStyle/>
-          <a:p>
-            <a:r>
-              <a:rPr lang="de-AT" dirty="0" smtClean="0"/>
-              <a:t>SOA Lifecycle</a:t>
-            </a:r>
-            <a:endParaRPr lang="de-AT" dirty="0"/>
-          </a:p>
-        </p:txBody>
-      </p:sp>
-      <p:pic>
-        <p:nvPicPr>
-          <p:cNvPr id="3" name="Picture 2"/>
-          <p:cNvPicPr>
-            <a:picLocks noChangeAspect="1"/>
-          </p:cNvPicPr>
-          <p:nvPr/>
-        </p:nvPicPr>
-        <p:blipFill>
-          <a:blip r:embed="rId2">
-            <a:extLst>
-              <a:ext uri="{28A0092B-C50C-407E-A947-70E740481C1C}">
-                <a14:useLocalDpi xmlns:a14="http://schemas.microsoft.com/office/drawing/2010/main" val="0"/>
-              </a:ext>
-            </a:extLst>
-          </a:blip>
-          <a:stretch>
-            <a:fillRect/>
-          </a:stretch>
-        </p:blipFill>
-        <p:spPr>
-          <a:xfrm>
-            <a:off x="5918915" y="628370"/>
-            <a:ext cx="5582429" cy="5048955"/>
-          </a:xfrm>
-          <a:prstGeom prst="rect">
-            <a:avLst/>
-          </a:prstGeom>
-        </p:spPr>
-      </p:pic>
-      <p:sp>
-        <p:nvSpPr>
-          <p:cNvPr id="9" name="Foliennummernplatzhalter 8"/>
-          <p:cNvSpPr>
-            <a:spLocks noGrp="1"/>
-          </p:cNvSpPr>
-          <p:nvPr>
-            <p:ph type="sldNum" sz="quarter" idx="12"/>
-          </p:nvPr>
-        </p:nvSpPr>
-        <p:spPr/>
-        <p:txBody>
-          <a:bodyPr/>
-          <a:lstStyle/>
-          <a:p>
-            <a:fld id="{0582A2BA-FDDD-4C1C-9C58-E41C263E2DD2}" type="slidenum">
-              <a:rPr lang="de-AT" smtClean="0"/>
-              <a:t>7</a:t>
-            </a:fld>
-            <a:endParaRPr lang="de-AT"/>
-          </a:p>
-        </p:txBody>
-      </p:sp>
-      <p:sp>
-        <p:nvSpPr>
-          <p:cNvPr id="10" name="Fußzeilenplatzhalter 9"/>
-          <p:cNvSpPr>
-            <a:spLocks noGrp="1"/>
-          </p:cNvSpPr>
-          <p:nvPr>
-            <p:ph type="ftr" sz="quarter" idx="11"/>
-          </p:nvPr>
-        </p:nvSpPr>
-        <p:spPr/>
-        <p:txBody>
-          <a:bodyPr/>
-          <a:lstStyle/>
-          <a:p>
-            <a:r>
-              <a:rPr lang="de-AT" smtClean="0"/>
-              <a:t>SOA, REST &amp; JSON</a:t>
-            </a:r>
-            <a:endParaRPr lang="de-AT"/>
-          </a:p>
-        </p:txBody>
-      </p:sp>
-      <p:sp>
-        <p:nvSpPr>
-          <p:cNvPr id="11" name="Datumsplatzhalter 10"/>
-          <p:cNvSpPr>
-            <a:spLocks noGrp="1"/>
-          </p:cNvSpPr>
-          <p:nvPr>
-            <p:ph type="dt" sz="half" idx="10"/>
-          </p:nvPr>
-        </p:nvSpPr>
-        <p:spPr/>
-        <p:txBody>
-          <a:bodyPr/>
-          <a:lstStyle/>
-          <a:p>
-            <a:r>
-              <a:rPr lang="de-DE" smtClean="0"/>
-              <a:t>20.03.2015</a:t>
-            </a:r>
-            <a:endParaRPr lang="de-AT"/>
-          </a:p>
-        </p:txBody>
-      </p:sp>
-    </p:spTree>
-    <p:extLst>
-      <p:ext uri="{BB962C8B-B14F-4D97-AF65-F5344CB8AC3E}">
-        <p14:creationId xmlns:p14="http://schemas.microsoft.com/office/powerpoint/2010/main" val="2296427799"/>
-      </p:ext>
-    </p:extLst>
-  </p:cSld>
-  <p:clrMapOvr>
-    <a:masterClrMapping/>
-  </p:clrMapOvr>
-  <p:transition spd="slow">
-    <p:push dir="u"/>
-  </p:transition>
-  <p:timing>
-    <p:tnLst>
-      <p:par>
-        <p:cTn id="1" dur="indefinite" restart="never" nodeType="tmRoot">
-          <p:childTnLst>
-            <p:seq concurrent="1" nextAc="seek">
-              <p:cTn id="2" dur="indefinite" nodeType="mainSeq">
-                <p:childTnLst>
-                  <p:par>
-                    <p:cTn id="3" fill="hold">
-                      <p:stCondLst>
-                        <p:cond delay="indefinite"/>
-                      </p:stCondLst>
-                      <p:childTnLst>
-                        <p:par>
-                          <p:cTn id="4" fill="hold">
-                            <p:stCondLst>
-                              <p:cond delay="0"/>
-                            </p:stCondLst>
-                            <p:childTnLst>
-                              <p:par>
-                                <p:cTn id="5" presetID="10" presetClass="entr" presetSubtype="0" fill="hold" nodeType="clickEffect">
-                                  <p:stCondLst>
-                                    <p:cond delay="0"/>
-                                  </p:stCondLst>
-                                  <p:childTnLst>
-                                    <p:set>
-                                      <p:cBhvr>
-                                        <p:cTn id="6" dur="1" fill="hold">
-                                          <p:stCondLst>
-                                            <p:cond delay="0"/>
-                                          </p:stCondLst>
-                                        </p:cTn>
-                                        <p:tgtEl>
-                                          <p:spTgt spid="8"/>
-                                        </p:tgtEl>
-                                        <p:attrNameLst>
-                                          <p:attrName>style.visibility</p:attrName>
-                                        </p:attrNameLst>
-                                      </p:cBhvr>
-                                      <p:to>
-                                        <p:strVal val="visible"/>
-                                      </p:to>
-                                    </p:set>
-                                    <p:animEffect transition="in" filter="fade">
-                                      <p:cBhvr>
-                                        <p:cTn id="7" dur="500"/>
-                                        <p:tgtEl>
-                                          <p:spTgt spid="8"/>
-                                        </p:tgtEl>
-                                      </p:cBhvr>
-                                    </p:animEffect>
-                                  </p:childTnLst>
-                                </p:cTn>
-                              </p:par>
-                            </p:childTnLst>
-                          </p:cTn>
-                        </p:par>
-                      </p:childTnLst>
-                    </p:cTn>
-                  </p:par>
-                  <p:par>
-                    <p:cTn id="8" fill="hold">
-                      <p:stCondLst>
-                        <p:cond delay="indefinite"/>
-                      </p:stCondLst>
-                      <p:childTnLst>
-                        <p:par>
-                          <p:cTn id="9" fill="hold">
-                            <p:stCondLst>
-                              <p:cond delay="0"/>
-                            </p:stCondLst>
-                            <p:childTnLst>
-                              <p:par>
-                                <p:cTn id="10" presetID="10" presetClass="exit" presetSubtype="0" fill="hold" nodeType="clickEffect">
-                                  <p:stCondLst>
-                                    <p:cond delay="0"/>
-                                  </p:stCondLst>
-                                  <p:childTnLst>
-                                    <p:animEffect transition="out" filter="fade">
-                                      <p:cBhvr>
-                                        <p:cTn id="11" dur="500"/>
-                                        <p:tgtEl>
-                                          <p:spTgt spid="8"/>
-                                        </p:tgtEl>
-                                      </p:cBhvr>
-                                    </p:animEffect>
-                                    <p:set>
-                                      <p:cBhvr>
-                                        <p:cTn id="12" dur="1" fill="hold">
-                                          <p:stCondLst>
-                                            <p:cond delay="499"/>
-                                          </p:stCondLst>
-                                        </p:cTn>
-                                        <p:tgtEl>
-                                          <p:spTgt spid="8"/>
-                                        </p:tgtEl>
-                                        <p:attrNameLst>
-                                          <p:attrName>style.visibility</p:attrName>
-                                        </p:attrNameLst>
-                                      </p:cBhvr>
-                                      <p:to>
-                                        <p:strVal val="hidden"/>
-                                      </p:to>
-                                    </p:set>
-                                  </p:childTnLst>
-                                </p:cTn>
-                              </p:par>
-                            </p:childTnLst>
-                          </p:cTn>
-                        </p:par>
-                      </p:childTnLst>
-                    </p:cTn>
-                  </p:par>
-                  <p:par>
-                    <p:cTn id="13" fill="hold">
-                      <p:stCondLst>
-                        <p:cond delay="indefinite"/>
-                      </p:stCondLst>
-                      <p:childTnLst>
-                        <p:par>
-                          <p:cTn id="14" fill="hold">
-                            <p:stCondLst>
-                              <p:cond delay="0"/>
-                            </p:stCondLst>
-                            <p:childTnLst>
-                              <p:par>
-                                <p:cTn id="15" presetID="10" presetClass="entr" presetSubtype="0" fill="hold" nodeType="clickEffect">
-                                  <p:stCondLst>
-                                    <p:cond delay="0"/>
-                                  </p:stCondLst>
-                                  <p:childTnLst>
-                                    <p:set>
-                                      <p:cBhvr>
-                                        <p:cTn id="16" dur="1" fill="hold">
-                                          <p:stCondLst>
-                                            <p:cond delay="0"/>
-                                          </p:stCondLst>
-                                        </p:cTn>
-                                        <p:tgtEl>
-                                          <p:spTgt spid="3"/>
-                                        </p:tgtEl>
-                                        <p:attrNameLst>
-                                          <p:attrName>style.visibility</p:attrName>
-                                        </p:attrNameLst>
-                                      </p:cBhvr>
-                                      <p:to>
-                                        <p:strVal val="visible"/>
-                                      </p:to>
-                                    </p:set>
-                                    <p:animEffect transition="in" filter="fade">
-                                      <p:cBhvr>
-                                        <p:cTn id="17" dur="500"/>
-                                        <p:tgtEl>
-                                          <p:spTgt spid="3"/>
-                                        </p:tgtEl>
-                                      </p:cBhvr>
-                                    </p:animEffect>
-                                  </p:childTnLst>
-                                </p:cTn>
-                              </p:par>
-                            </p:childTnLst>
-                          </p:cTn>
-                        </p:par>
-                      </p:childTnLst>
-                    </p:cTn>
-                  </p:par>
-                </p:childTnLst>
-              </p:cTn>
-              <p:prevCondLst>
-                <p:cond evt="onPrev" delay="0">
-                  <p:tgtEl>
-                    <p:sldTgt/>
-                  </p:tgtEl>
-                </p:cond>
-              </p:prevCondLst>
-              <p:nextCondLst>
-                <p:cond evt="onNext" delay="0">
-                  <p:tgtEl>
-                    <p:sldTgt/>
-                  </p:tgtEl>
-                </p:cond>
-              </p:nextCondLst>
-            </p:seq>
-          </p:childTnLst>
-        </p:cTn>
-      </p:par>
-    </p:tnLst>
-  </p:timing>
-</p:sld>
-</file>
-
 <file path=ppt/slides/slide8.xml><?xml version="1.0" encoding="utf-8"?>
 <p:sld xmlns:a="http://schemas.openxmlformats.org/drawingml/2006/main" xmlns:r="http://schemas.openxmlformats.org/officeDocument/2006/relationships" xmlns:p="http://schemas.openxmlformats.org/presentationml/2006/main" show="0">
   <p:cSld>
@@ -14380,10 +14411,10 @@
           <a:bodyPr/>
           <a:lstStyle/>
           <a:p>
-            <a:r>
+            <a:fld id="{88FA3088-DB44-4133-BD06-DCED81403DD1}" type="datetime1">
               <a:rPr lang="de-DE" smtClean="0"/>
               <a:t>20.03.2015</a:t>
-            </a:r>
+            </a:fld>
             <a:endParaRPr lang="de-AT"/>
           </a:p>
         </p:txBody>
@@ -14412,7 +14443,7 @@
 </file>
 
 <file path=ppt/slides/slide9.xml><?xml version="1.0" encoding="utf-8"?>
-<p:sld xmlns:a="http://schemas.openxmlformats.org/drawingml/2006/main" xmlns:r="http://schemas.openxmlformats.org/officeDocument/2006/relationships" xmlns:p="http://schemas.openxmlformats.org/presentationml/2006/main">
+<p:sld xmlns:a="http://schemas.openxmlformats.org/drawingml/2006/main" xmlns:r="http://schemas.openxmlformats.org/officeDocument/2006/relationships" xmlns:p="http://schemas.openxmlformats.org/presentationml/2006/main" show="0">
   <p:cSld>
     <p:spTree>
       <p:nvGrpSpPr>
@@ -14428,30 +14459,61 @@
           <a:chExt cx="0" cy="0"/>
         </a:xfrm>
       </p:grpSpPr>
+      <p:sp>
+        <p:nvSpPr>
+          <p:cNvPr id="2" name="Title 1"/>
+          <p:cNvSpPr>
+            <a:spLocks noGrp="1"/>
+          </p:cNvSpPr>
+          <p:nvPr>
+            <p:ph type="title"/>
+          </p:nvPr>
+        </p:nvSpPr>
+        <p:spPr/>
+        <p:txBody>
+          <a:bodyPr/>
+          <a:lstStyle/>
+          <a:p>
+            <a:endParaRPr lang="de-AT"/>
+          </a:p>
+        </p:txBody>
+      </p:sp>
+      <p:sp>
+        <p:nvSpPr>
+          <p:cNvPr id="3" name="Content Placeholder 2"/>
+          <p:cNvSpPr>
+            <a:spLocks noGrp="1"/>
+          </p:cNvSpPr>
+          <p:nvPr>
+            <p:ph idx="1"/>
+          </p:nvPr>
+        </p:nvSpPr>
+        <p:spPr/>
+        <p:txBody>
+          <a:bodyPr/>
+          <a:lstStyle/>
+          <a:p>
+            <a:endParaRPr lang="de-AT"/>
+          </a:p>
+        </p:txBody>
+      </p:sp>
       <p:pic>
         <p:nvPicPr>
-          <p:cNvPr id="11" name="Picture 10"/>
+          <p:cNvPr id="4" name="Picture 3"/>
           <p:cNvPicPr>
             <a:picLocks noChangeAspect="1"/>
           </p:cNvPicPr>
           <p:nvPr/>
         </p:nvPicPr>
-        <p:blipFill>
-          <a:blip r:embed="rId2">
-            <a:extLst>
-              <a:ext uri="{28A0092B-C50C-407E-A947-70E740481C1C}">
-                <a14:useLocalDpi xmlns:a14="http://schemas.microsoft.com/office/drawing/2010/main" val="0"/>
-              </a:ext>
-            </a:extLst>
-          </a:blip>
-          <a:stretch>
-            <a:fillRect/>
-          </a:stretch>
+        <p:blipFill rotWithShape="1">
+          <a:blip r:embed="rId2"/>
+          <a:srcRect l="7602" r="35384" b="35255"/>
+          <a:stretch/>
         </p:blipFill>
         <p:spPr>
           <a:xfrm>
-            <a:off x="5343159" y="-1"/>
-            <a:ext cx="6010641" cy="4365939"/>
+            <a:off x="579549" y="-228600"/>
+            <a:ext cx="7418231" cy="4736206"/>
           </a:xfrm>
           <a:prstGeom prst="rect">
             <a:avLst/>
@@ -14460,80 +14522,7 @@
       </p:pic>
       <p:sp>
         <p:nvSpPr>
-          <p:cNvPr id="5" name="Title 4"/>
-          <p:cNvSpPr>
-            <a:spLocks noGrp="1"/>
-          </p:cNvSpPr>
-          <p:nvPr>
-            <p:ph type="title"/>
-          </p:nvPr>
-        </p:nvSpPr>
-        <p:spPr/>
-        <p:txBody>
-          <a:bodyPr/>
-          <a:lstStyle/>
-          <a:p>
-            <a:r>
-              <a:rPr lang="de-AT" dirty="0" smtClean="0"/>
-              <a:t>Service</a:t>
-            </a:r>
-            <a:endParaRPr lang="de-AT" dirty="0"/>
-          </a:p>
-        </p:txBody>
-      </p:sp>
-      <p:sp>
-        <p:nvSpPr>
-          <p:cNvPr id="10" name="Content Placeholder 9"/>
-          <p:cNvSpPr>
-            <a:spLocks noGrp="1"/>
-          </p:cNvSpPr>
-          <p:nvPr>
-            <p:ph idx="1"/>
-          </p:nvPr>
-        </p:nvSpPr>
-        <p:spPr/>
-        <p:txBody>
-          <a:bodyPr/>
-          <a:lstStyle/>
-          <a:p>
-            <a:r>
-              <a:rPr lang="de-AT" dirty="0" smtClean="0"/>
-              <a:t>Unit of logic</a:t>
-            </a:r>
-          </a:p>
-          <a:p>
-            <a:endParaRPr lang="de-AT" dirty="0"/>
-          </a:p>
-          <a:p>
-            <a:r>
-              <a:rPr lang="de-AT" dirty="0" smtClean="0"/>
-              <a:t>SOA Design Principles Applied</a:t>
-            </a:r>
-          </a:p>
-          <a:p>
-            <a:endParaRPr lang="de-AT" dirty="0"/>
-          </a:p>
-          <a:p>
-            <a:r>
-              <a:rPr lang="de-AT" dirty="0" smtClean="0"/>
-              <a:t>Clearly defined function</a:t>
-            </a:r>
-          </a:p>
-          <a:p>
-            <a:endParaRPr lang="de-AT" dirty="0"/>
-          </a:p>
-          <a:p>
-            <a:r>
-              <a:rPr lang="de-AT" dirty="0" smtClean="0"/>
-              <a:t>Description of the functionality</a:t>
-            </a:r>
-            <a:endParaRPr lang="de-AT" dirty="0"/>
-          </a:p>
-        </p:txBody>
-      </p:sp>
-      <p:sp>
-        <p:nvSpPr>
-          <p:cNvPr id="2" name="Foliennummernplatzhalter 1"/>
+          <p:cNvPr id="8" name="Foliennummernplatzhalter 7"/>
           <p:cNvSpPr>
             <a:spLocks noGrp="1"/>
           </p:cNvSpPr>
@@ -14556,7 +14545,7 @@
       </p:sp>
       <p:sp>
         <p:nvSpPr>
-          <p:cNvPr id="3" name="Fußzeilenplatzhalter 2"/>
+          <p:cNvPr id="9" name="Fußzeilenplatzhalter 8"/>
           <p:cNvSpPr>
             <a:spLocks noGrp="1"/>
           </p:cNvSpPr>
@@ -14579,7 +14568,7 @@
       </p:sp>
       <p:sp>
         <p:nvSpPr>
-          <p:cNvPr id="4" name="Datumsplatzhalter 3"/>
+          <p:cNvPr id="10" name="Datumsplatzhalter 9"/>
           <p:cNvSpPr>
             <a:spLocks noGrp="1"/>
           </p:cNvSpPr>
@@ -14592,10 +14581,10 @@
           <a:bodyPr/>
           <a:lstStyle/>
           <a:p>
-            <a:r>
+            <a:fld id="{BD66C334-7484-4E79-8091-0F622832BC14}" type="datetime1">
               <a:rPr lang="de-DE" smtClean="0"/>
               <a:t>20.03.2015</a:t>
-            </a:r>
+            </a:fld>
             <a:endParaRPr lang="de-AT"/>
           </a:p>
         </p:txBody>
@@ -14603,7 +14592,7 @@
     </p:spTree>
     <p:extLst>
       <p:ext uri="{BB962C8B-B14F-4D97-AF65-F5344CB8AC3E}">
-        <p14:creationId xmlns:p14="http://schemas.microsoft.com/office/powerpoint/2010/main" val="137191320"/>
+        <p14:creationId xmlns:p14="http://schemas.microsoft.com/office/powerpoint/2010/main" val="2173474422"/>
       </p:ext>
     </p:extLst>
   </p:cSld>

</xml_diff>